<commit_message>
changement le titre dans le powerpoint
</commit_message>
<xml_diff>
--- a/Module 214 - Fabrication RJ45.pptx
+++ b/Module 214 - Fabrication RJ45.pptx
@@ -2,7 +2,7 @@
 <file path=ppt/presentation.xml><?xml version="1.0" encoding="utf-8"?>
 <p:presentation xmlns:a="http://schemas.openxmlformats.org/drawingml/2006/main" xmlns:r="http://schemas.openxmlformats.org/officeDocument/2006/relationships" xmlns:p="http://schemas.openxmlformats.org/presentationml/2006/main" saveSubsetFonts="1">
   <p:sldMasterIdLst>
-    <p:sldMasterId id="2147483822" r:id="rId1"/>
+    <p:sldMasterId id="2147483840" r:id="rId1"/>
   </p:sldMasterIdLst>
   <p:sldIdLst>
     <p:sldId id="256" r:id="rId2"/>
@@ -111,6 +111,11 @@
       </a:defRPr>
     </a:lvl9pPr>
   </p:defaultTextStyle>
+  <p:extLst>
+    <p:ext uri="{EFAFB233-063F-42B5-8137-9DF3F51BA10A}">
+      <p15:sldGuideLst xmlns:p15="http://schemas.microsoft.com/office/powerpoint/2012/main"/>
+    </p:ext>
+  </p:extLst>
 </p:presentation>
 </file>
 
@@ -131,319 +136,6 @@
           <a:chExt cx="0" cy="0"/>
         </a:xfrm>
       </p:grpSpPr>
-      <p:grpSp>
-        <p:nvGrpSpPr>
-          <p:cNvPr id="19" name="Group 18"/>
-          <p:cNvGrpSpPr/>
-          <p:nvPr/>
-        </p:nvGrpSpPr>
-        <p:grpSpPr>
-          <a:xfrm>
-            <a:off x="546100" y="-4763"/>
-            <a:ext cx="5014912" cy="6862763"/>
-            <a:chOff x="2928938" y="-4763"/>
-            <a:chExt cx="5014912" cy="6862763"/>
-          </a:xfrm>
-        </p:grpSpPr>
-        <p:sp>
-          <p:nvSpPr>
-            <p:cNvPr id="22" name="Freeform 6"/>
-            <p:cNvSpPr/>
-            <p:nvPr/>
-          </p:nvSpPr>
-          <p:spPr bwMode="auto">
-            <a:xfrm>
-              <a:off x="3367088" y="-4763"/>
-              <a:ext cx="1063625" cy="2782888"/>
-            </a:xfrm>
-            <a:custGeom>
-              <a:avLst/>
-              <a:gdLst/>
-              <a:ahLst/>
-              <a:cxnLst/>
-              <a:rect l="0" t="0" r="r" b="b"/>
-              <a:pathLst>
-                <a:path w="670" h="1753">
-                  <a:moveTo>
-                    <a:pt x="0" y="1696"/>
-                  </a:moveTo>
-                  <a:lnTo>
-                    <a:pt x="225" y="1753"/>
-                  </a:lnTo>
-                  <a:lnTo>
-                    <a:pt x="670" y="0"/>
-                  </a:lnTo>
-                  <a:lnTo>
-                    <a:pt x="430" y="0"/>
-                  </a:lnTo>
-                  <a:lnTo>
-                    <a:pt x="0" y="1696"/>
-                  </a:lnTo>
-                  <a:close/>
-                </a:path>
-              </a:pathLst>
-            </a:custGeom>
-            <a:solidFill>
-              <a:schemeClr val="accent1"/>
-            </a:solidFill>
-            <a:ln>
-              <a:noFill/>
-            </a:ln>
-          </p:spPr>
-        </p:sp>
-        <p:sp>
-          <p:nvSpPr>
-            <p:cNvPr id="23" name="Freeform 7"/>
-            <p:cNvSpPr/>
-            <p:nvPr/>
-          </p:nvSpPr>
-          <p:spPr bwMode="auto">
-            <a:xfrm>
-              <a:off x="2928938" y="-4763"/>
-              <a:ext cx="1035050" cy="2673350"/>
-            </a:xfrm>
-            <a:custGeom>
-              <a:avLst/>
-              <a:gdLst/>
-              <a:ahLst/>
-              <a:cxnLst/>
-              <a:rect l="0" t="0" r="r" b="b"/>
-              <a:pathLst>
-                <a:path w="652" h="1684">
-                  <a:moveTo>
-                    <a:pt x="225" y="1684"/>
-                  </a:moveTo>
-                  <a:lnTo>
-                    <a:pt x="652" y="0"/>
-                  </a:lnTo>
-                  <a:lnTo>
-                    <a:pt x="411" y="0"/>
-                  </a:lnTo>
-                  <a:lnTo>
-                    <a:pt x="0" y="1627"/>
-                  </a:lnTo>
-                  <a:lnTo>
-                    <a:pt x="219" y="1681"/>
-                  </a:lnTo>
-                  <a:lnTo>
-                    <a:pt x="225" y="1684"/>
-                  </a:lnTo>
-                  <a:close/>
-                </a:path>
-              </a:pathLst>
-            </a:custGeom>
-            <a:solidFill>
-              <a:schemeClr val="tx1">
-                <a:lumMod val="65000"/>
-                <a:lumOff val="35000"/>
-              </a:schemeClr>
-            </a:solidFill>
-            <a:ln>
-              <a:noFill/>
-            </a:ln>
-          </p:spPr>
-        </p:sp>
-        <p:sp>
-          <p:nvSpPr>
-            <p:cNvPr id="24" name="Freeform 9"/>
-            <p:cNvSpPr/>
-            <p:nvPr/>
-          </p:nvSpPr>
-          <p:spPr bwMode="auto">
-            <a:xfrm>
-              <a:off x="2928938" y="2582862"/>
-              <a:ext cx="2693987" cy="4275138"/>
-            </a:xfrm>
-            <a:custGeom>
-              <a:avLst/>
-              <a:gdLst/>
-              <a:ahLst/>
-              <a:cxnLst/>
-              <a:rect l="0" t="0" r="r" b="b"/>
-              <a:pathLst>
-                <a:path w="1697" h="2693">
-                  <a:moveTo>
-                    <a:pt x="0" y="0"/>
-                  </a:moveTo>
-                  <a:lnTo>
-                    <a:pt x="1622" y="2693"/>
-                  </a:lnTo>
-                  <a:lnTo>
-                    <a:pt x="1697" y="2693"/>
-                  </a:lnTo>
-                  <a:lnTo>
-                    <a:pt x="0" y="0"/>
-                  </a:lnTo>
-                  <a:close/>
-                </a:path>
-              </a:pathLst>
-            </a:custGeom>
-            <a:solidFill>
-              <a:schemeClr val="tx1">
-                <a:lumMod val="85000"/>
-                <a:lumOff val="15000"/>
-              </a:schemeClr>
-            </a:solidFill>
-            <a:ln>
-              <a:noFill/>
-            </a:ln>
-          </p:spPr>
-        </p:sp>
-        <p:sp>
-          <p:nvSpPr>
-            <p:cNvPr id="25" name="Freeform 10"/>
-            <p:cNvSpPr/>
-            <p:nvPr/>
-          </p:nvSpPr>
-          <p:spPr bwMode="auto">
-            <a:xfrm>
-              <a:off x="3371850" y="2692400"/>
-              <a:ext cx="3332162" cy="4165600"/>
-            </a:xfrm>
-            <a:custGeom>
-              <a:avLst/>
-              <a:gdLst/>
-              <a:ahLst/>
-              <a:cxnLst/>
-              <a:rect l="0" t="0" r="r" b="b"/>
-              <a:pathLst>
-                <a:path w="2099" h="2624">
-                  <a:moveTo>
-                    <a:pt x="2099" y="2624"/>
-                  </a:moveTo>
-                  <a:lnTo>
-                    <a:pt x="0" y="0"/>
-                  </a:lnTo>
-                  <a:lnTo>
-                    <a:pt x="2021" y="2624"/>
-                  </a:lnTo>
-                  <a:lnTo>
-                    <a:pt x="2099" y="2624"/>
-                  </a:lnTo>
-                  <a:close/>
-                </a:path>
-              </a:pathLst>
-            </a:custGeom>
-            <a:solidFill>
-              <a:schemeClr val="accent1">
-                <a:lumMod val="50000"/>
-              </a:schemeClr>
-            </a:solidFill>
-            <a:ln>
-              <a:noFill/>
-            </a:ln>
-          </p:spPr>
-        </p:sp>
-        <p:sp>
-          <p:nvSpPr>
-            <p:cNvPr id="26" name="Freeform 11"/>
-            <p:cNvSpPr/>
-            <p:nvPr/>
-          </p:nvSpPr>
-          <p:spPr bwMode="auto">
-            <a:xfrm>
-              <a:off x="3367088" y="2687637"/>
-              <a:ext cx="4576762" cy="4170363"/>
-            </a:xfrm>
-            <a:custGeom>
-              <a:avLst/>
-              <a:gdLst/>
-              <a:ahLst/>
-              <a:cxnLst/>
-              <a:rect l="0" t="0" r="r" b="b"/>
-              <a:pathLst>
-                <a:path w="2883" h="2627">
-                  <a:moveTo>
-                    <a:pt x="0" y="0"/>
-                  </a:moveTo>
-                  <a:lnTo>
-                    <a:pt x="3" y="3"/>
-                  </a:lnTo>
-                  <a:lnTo>
-                    <a:pt x="2102" y="2627"/>
-                  </a:lnTo>
-                  <a:lnTo>
-                    <a:pt x="2883" y="2627"/>
-                  </a:lnTo>
-                  <a:lnTo>
-                    <a:pt x="225" y="57"/>
-                  </a:lnTo>
-                  <a:lnTo>
-                    <a:pt x="0" y="0"/>
-                  </a:lnTo>
-                  <a:close/>
-                </a:path>
-              </a:pathLst>
-            </a:custGeom>
-            <a:solidFill>
-              <a:schemeClr val="accent1">
-                <a:lumMod val="75000"/>
-              </a:schemeClr>
-            </a:solidFill>
-            <a:ln>
-              <a:noFill/>
-            </a:ln>
-          </p:spPr>
-        </p:sp>
-        <p:sp>
-          <p:nvSpPr>
-            <p:cNvPr id="27" name="Freeform 12"/>
-            <p:cNvSpPr/>
-            <p:nvPr/>
-          </p:nvSpPr>
-          <p:spPr bwMode="auto">
-            <a:xfrm>
-              <a:off x="2928938" y="2578100"/>
-              <a:ext cx="3584575" cy="4279900"/>
-            </a:xfrm>
-            <a:custGeom>
-              <a:avLst/>
-              <a:gdLst/>
-              <a:ahLst/>
-              <a:cxnLst/>
-              <a:rect l="0" t="0" r="r" b="b"/>
-              <a:pathLst>
-                <a:path w="2258" h="2696">
-                  <a:moveTo>
-                    <a:pt x="2258" y="2696"/>
-                  </a:moveTo>
-                  <a:lnTo>
-                    <a:pt x="264" y="111"/>
-                  </a:lnTo>
-                  <a:lnTo>
-                    <a:pt x="228" y="60"/>
-                  </a:lnTo>
-                  <a:lnTo>
-                    <a:pt x="225" y="57"/>
-                  </a:lnTo>
-                  <a:lnTo>
-                    <a:pt x="0" y="0"/>
-                  </a:lnTo>
-                  <a:lnTo>
-                    <a:pt x="0" y="3"/>
-                  </a:lnTo>
-                  <a:lnTo>
-                    <a:pt x="1697" y="2696"/>
-                  </a:lnTo>
-                  <a:lnTo>
-                    <a:pt x="2258" y="2696"/>
-                  </a:lnTo>
-                  <a:close/>
-                </a:path>
-              </a:pathLst>
-            </a:custGeom>
-            <a:solidFill>
-              <a:schemeClr val="tx1">
-                <a:lumMod val="75000"/>
-                <a:lumOff val="25000"/>
-              </a:schemeClr>
-            </a:solidFill>
-            <a:ln>
-              <a:noFill/>
-            </a:ln>
-          </p:spPr>
-        </p:sp>
-      </p:grpSp>
       <p:sp>
         <p:nvSpPr>
           <p:cNvPr id="2" name="Title 1"/>
@@ -456,8 +148,8 @@
         </p:nvSpPr>
         <p:spPr>
           <a:xfrm>
-            <a:off x="2928401" y="1380068"/>
-            <a:ext cx="8574622" cy="2616199"/>
+            <a:off x="684212" y="685799"/>
+            <a:ext cx="8001000" cy="2971801"/>
           </a:xfrm>
         </p:spPr>
         <p:txBody>
@@ -465,8 +157,8 @@
             <a:normAutofit/>
           </a:bodyPr>
           <a:lstStyle>
-            <a:lvl1pPr algn="r">
-              <a:defRPr sz="6000">
+            <a:lvl1pPr algn="l">
+              <a:defRPr sz="4800">
                 <a:effectLst/>
               </a:defRPr>
             </a:lvl1pPr>
@@ -492,8 +184,8 @@
         </p:nvSpPr>
         <p:spPr>
           <a:xfrm>
-            <a:off x="4515377" y="3996267"/>
-            <a:ext cx="6987645" cy="1388534"/>
+            <a:off x="684212" y="3843867"/>
+            <a:ext cx="6400800" cy="1947333"/>
           </a:xfrm>
         </p:spPr>
         <p:txBody>
@@ -501,11 +193,13 @@
             <a:normAutofit/>
           </a:bodyPr>
           <a:lstStyle>
-            <a:lvl1pPr marL="0" indent="0" algn="r">
+            <a:lvl1pPr marL="0" indent="0" algn="l">
               <a:buNone/>
               <a:defRPr sz="2100">
                 <a:solidFill>
-                  <a:schemeClr val="tx1"/>
+                  <a:schemeClr val="bg2">
+                    <a:lumMod val="75000"/>
+                  </a:schemeClr>
                 </a:solidFill>
               </a:defRPr>
             </a:lvl1pPr>
@@ -616,7 +310,7 @@
           <a:p>
             <a:fld id="{D406E69D-613E-4019-8533-7F772451DAA2}" type="datetimeFigureOut">
               <a:rPr lang="fr-CH" smtClean="0"/>
-              <a:t>11.02.2019</a:t>
+              <a:t>18.02.2019</a:t>
             </a:fld>
             <a:endParaRPr lang="fr-CH"/>
           </a:p>
@@ -632,12 +326,7 @@
             <p:ph type="ftr" sz="quarter" idx="11"/>
           </p:nvPr>
         </p:nvSpPr>
-        <p:spPr>
-          <a:xfrm>
-            <a:off x="5332412" y="5883275"/>
-            <a:ext cx="4324044" cy="365125"/>
-          </a:xfrm>
-        </p:spPr>
+        <p:spPr/>
         <p:txBody>
           <a:bodyPr/>
           <a:lstStyle/>
@@ -669,10 +358,185 @@
           </a:p>
         </p:txBody>
       </p:sp>
+      <p:cxnSp>
+        <p:nvCxnSpPr>
+          <p:cNvPr id="16" name="Straight Connector 15"/>
+          <p:cNvCxnSpPr/>
+          <p:nvPr/>
+        </p:nvCxnSpPr>
+        <p:spPr>
+          <a:xfrm flipH="1">
+            <a:off x="8228012" y="8467"/>
+            <a:ext cx="3810000" cy="3810000"/>
+          </a:xfrm>
+          <a:prstGeom prst="line">
+            <a:avLst/>
+          </a:prstGeom>
+          <a:ln w="12700">
+            <a:solidFill>
+              <a:schemeClr val="tx1"/>
+            </a:solidFill>
+          </a:ln>
+        </p:spPr>
+        <p:style>
+          <a:lnRef idx="2">
+            <a:schemeClr val="accent1"/>
+          </a:lnRef>
+          <a:fillRef idx="0">
+            <a:schemeClr val="accent1"/>
+          </a:fillRef>
+          <a:effectRef idx="1">
+            <a:schemeClr val="accent1"/>
+          </a:effectRef>
+          <a:fontRef idx="minor">
+            <a:schemeClr val="tx1"/>
+          </a:fontRef>
+        </p:style>
+      </p:cxnSp>
+      <p:cxnSp>
+        <p:nvCxnSpPr>
+          <p:cNvPr id="17" name="Straight Connector 16"/>
+          <p:cNvCxnSpPr/>
+          <p:nvPr/>
+        </p:nvCxnSpPr>
+        <p:spPr>
+          <a:xfrm flipH="1">
+            <a:off x="6108170" y="91545"/>
+            <a:ext cx="6080655" cy="6080655"/>
+          </a:xfrm>
+          <a:prstGeom prst="line">
+            <a:avLst/>
+          </a:prstGeom>
+          <a:ln w="12700">
+            <a:solidFill>
+              <a:schemeClr val="tx1"/>
+            </a:solidFill>
+          </a:ln>
+        </p:spPr>
+        <p:style>
+          <a:lnRef idx="2">
+            <a:schemeClr val="accent1"/>
+          </a:lnRef>
+          <a:fillRef idx="0">
+            <a:schemeClr val="accent1"/>
+          </a:fillRef>
+          <a:effectRef idx="1">
+            <a:schemeClr val="accent1"/>
+          </a:effectRef>
+          <a:fontRef idx="minor">
+            <a:schemeClr val="tx1"/>
+          </a:fontRef>
+        </p:style>
+      </p:cxnSp>
+      <p:cxnSp>
+        <p:nvCxnSpPr>
+          <p:cNvPr id="19" name="Straight Connector 18"/>
+          <p:cNvCxnSpPr/>
+          <p:nvPr/>
+        </p:nvCxnSpPr>
+        <p:spPr>
+          <a:xfrm flipH="1">
+            <a:off x="7235825" y="228600"/>
+            <a:ext cx="4953000" cy="4953000"/>
+          </a:xfrm>
+          <a:prstGeom prst="line">
+            <a:avLst/>
+          </a:prstGeom>
+          <a:ln w="12700">
+            <a:solidFill>
+              <a:schemeClr val="tx1"/>
+            </a:solidFill>
+          </a:ln>
+        </p:spPr>
+        <p:style>
+          <a:lnRef idx="2">
+            <a:schemeClr val="accent1"/>
+          </a:lnRef>
+          <a:fillRef idx="0">
+            <a:schemeClr val="accent1"/>
+          </a:fillRef>
+          <a:effectRef idx="1">
+            <a:schemeClr val="accent1"/>
+          </a:effectRef>
+          <a:fontRef idx="minor">
+            <a:schemeClr val="tx1"/>
+          </a:fontRef>
+        </p:style>
+      </p:cxnSp>
+      <p:cxnSp>
+        <p:nvCxnSpPr>
+          <p:cNvPr id="21" name="Straight Connector 20"/>
+          <p:cNvCxnSpPr/>
+          <p:nvPr/>
+        </p:nvCxnSpPr>
+        <p:spPr>
+          <a:xfrm flipH="1">
+            <a:off x="7335837" y="32278"/>
+            <a:ext cx="4852989" cy="4852989"/>
+          </a:xfrm>
+          <a:prstGeom prst="line">
+            <a:avLst/>
+          </a:prstGeom>
+          <a:ln w="31750">
+            <a:solidFill>
+              <a:schemeClr val="tx1"/>
+            </a:solidFill>
+          </a:ln>
+        </p:spPr>
+        <p:style>
+          <a:lnRef idx="2">
+            <a:schemeClr val="accent1"/>
+          </a:lnRef>
+          <a:fillRef idx="0">
+            <a:schemeClr val="accent1"/>
+          </a:fillRef>
+          <a:effectRef idx="1">
+            <a:schemeClr val="accent1"/>
+          </a:effectRef>
+          <a:fontRef idx="minor">
+            <a:schemeClr val="tx1"/>
+          </a:fontRef>
+        </p:style>
+      </p:cxnSp>
+      <p:cxnSp>
+        <p:nvCxnSpPr>
+          <p:cNvPr id="23" name="Straight Connector 22"/>
+          <p:cNvCxnSpPr/>
+          <p:nvPr/>
+        </p:nvCxnSpPr>
+        <p:spPr>
+          <a:xfrm flipH="1">
+            <a:off x="7845426" y="609601"/>
+            <a:ext cx="4343399" cy="4343399"/>
+          </a:xfrm>
+          <a:prstGeom prst="line">
+            <a:avLst/>
+          </a:prstGeom>
+          <a:ln w="31750">
+            <a:solidFill>
+              <a:schemeClr val="tx1"/>
+            </a:solidFill>
+          </a:ln>
+        </p:spPr>
+        <p:style>
+          <a:lnRef idx="2">
+            <a:schemeClr val="accent1"/>
+          </a:lnRef>
+          <a:fillRef idx="0">
+            <a:schemeClr val="accent1"/>
+          </a:fillRef>
+          <a:effectRef idx="1">
+            <a:schemeClr val="accent1"/>
+          </a:effectRef>
+          <a:fontRef idx="minor">
+            <a:schemeClr val="tx1"/>
+          </a:fontRef>
+        </p:style>
+      </p:cxnSp>
     </p:spTree>
     <p:extLst>
       <p:ext uri="{BB962C8B-B14F-4D97-AF65-F5344CB8AC3E}">
-        <p14:creationId xmlns:p14="http://schemas.microsoft.com/office/powerpoint/2010/main" val="6338125"/>
+        <p14:creationId xmlns:p14="http://schemas.microsoft.com/office/powerpoint/2010/main" val="10461613"/>
       </p:ext>
     </p:extLst>
   </p:cSld>
@@ -709,65 +573,46 @@
             <p:ph type="title"/>
           </p:nvPr>
         </p:nvSpPr>
+        <p:spPr/>
+        <p:txBody>
+          <a:bodyPr/>
+          <a:lstStyle/>
+          <a:p>
+            <a:r>
+              <a:rPr lang="en-US" smtClean="0"/>
+              <a:t>Click to edit Master title style</a:t>
+            </a:r>
+            <a:endParaRPr lang="en-US" dirty="0"/>
+          </a:p>
+        </p:txBody>
+      </p:sp>
+      <p:sp>
+        <p:nvSpPr>
+          <p:cNvPr id="17" name="Picture Placeholder 2"/>
+          <p:cNvSpPr>
+            <a:spLocks noGrp="1" noChangeAspect="1"/>
+          </p:cNvSpPr>
+          <p:nvPr>
+            <p:ph type="pic" idx="13"/>
+          </p:nvPr>
+        </p:nvSpPr>
         <p:spPr>
           <a:xfrm>
-            <a:off x="1484311" y="4732865"/>
-            <a:ext cx="10018711" cy="566738"/>
+            <a:off x="685800" y="533400"/>
+            <a:ext cx="10818812" cy="3124200"/>
           </a:xfrm>
-        </p:spPr>
-        <p:txBody>
-          <a:bodyPr anchor="b">
-            <a:normAutofit/>
-          </a:bodyPr>
-          <a:lstStyle>
-            <a:lvl1pPr algn="ctr">
-              <a:defRPr sz="2400" b="0"/>
-            </a:lvl1pPr>
-          </a:lstStyle>
-          <a:p>
-            <a:r>
-              <a:rPr lang="en-US" smtClean="0"/>
-              <a:t>Click to edit Master title style</a:t>
-            </a:r>
-            <a:endParaRPr lang="en-US" dirty="0"/>
-          </a:p>
-        </p:txBody>
-      </p:sp>
-      <p:sp>
-        <p:nvSpPr>
-          <p:cNvPr id="3" name="Picture Placeholder 2"/>
-          <p:cNvSpPr>
-            <a:spLocks noGrp="1" noChangeAspect="1"/>
-          </p:cNvSpPr>
-          <p:nvPr>
-            <p:ph type="pic" idx="1"/>
-          </p:nvPr>
-        </p:nvSpPr>
-        <p:spPr>
-          <a:xfrm>
-            <a:off x="2386012" y="932112"/>
-            <a:ext cx="8225944" cy="3164976"/>
-          </a:xfrm>
-          <a:prstGeom prst="roundRect">
+          <a:prstGeom prst="snip2DiagRect">
             <a:avLst>
-              <a:gd name="adj" fmla="val 4380"/>
+              <a:gd name="adj1" fmla="val 10815"/>
+              <a:gd name="adj2" fmla="val 0"/>
             </a:avLst>
           </a:prstGeom>
-          <a:ln w="38100">
-            <a:gradFill flip="none" rotWithShape="1">
-              <a:gsLst>
-                <a:gs pos="0">
-                  <a:schemeClr val="bg2"/>
-                </a:gs>
-                <a:gs pos="100000">
-                  <a:schemeClr val="bg2">
-                    <a:lumMod val="75000"/>
-                  </a:schemeClr>
-                </a:gs>
-              </a:gsLst>
-              <a:lin ang="5400000" scaled="0"/>
-              <a:tileRect/>
-            </a:gradFill>
+          <a:ln w="15875">
+            <a:solidFill>
+              <a:schemeClr val="tx1">
+                <a:alpha val="40000"/>
+              </a:schemeClr>
+            </a:solidFill>
           </a:ln>
           <a:effectLst>
             <a:innerShdw blurRad="57150" dist="38100" dir="14460000">
@@ -830,61 +675,50 @@
       </p:sp>
       <p:sp>
         <p:nvSpPr>
-          <p:cNvPr id="4" name="Text Placeholder 3"/>
-          <p:cNvSpPr>
-            <a:spLocks noGrp="1"/>
-          </p:cNvSpPr>
-          <p:nvPr>
-            <p:ph type="body" sz="half" idx="2"/>
+          <p:cNvPr id="16" name="Text Placeholder 9"/>
+          <p:cNvSpPr>
+            <a:spLocks noGrp="1"/>
+          </p:cNvSpPr>
+          <p:nvPr>
+            <p:ph type="body" sz="quarter" idx="14"/>
           </p:nvPr>
         </p:nvSpPr>
         <p:spPr>
           <a:xfrm>
-            <a:off x="1484311" y="5299603"/>
-            <a:ext cx="10018711" cy="493712"/>
+            <a:off x="914402" y="3843867"/>
+            <a:ext cx="8304210" cy="457200"/>
           </a:xfrm>
         </p:spPr>
         <p:txBody>
-          <a:bodyPr>
+          <a:bodyPr anchor="t">
             <a:normAutofit/>
           </a:bodyPr>
           <a:lstStyle>
-            <a:lvl1pPr marL="0" indent="0" algn="ctr">
-              <a:buNone/>
-              <a:defRPr sz="1400"/>
+            <a:lvl1pPr marL="0" indent="0">
+              <a:buFontTx/>
+              <a:buNone/>
+              <a:defRPr sz="1600"/>
             </a:lvl1pPr>
             <a:lvl2pPr marL="457200" indent="0">
-              <a:buNone/>
-              <a:defRPr sz="1200"/>
+              <a:buFontTx/>
+              <a:buNone/>
+              <a:defRPr/>
             </a:lvl2pPr>
             <a:lvl3pPr marL="914400" indent="0">
-              <a:buNone/>
-              <a:defRPr sz="1000"/>
+              <a:buFontTx/>
+              <a:buNone/>
+              <a:defRPr/>
             </a:lvl3pPr>
             <a:lvl4pPr marL="1371600" indent="0">
-              <a:buNone/>
-              <a:defRPr sz="900"/>
+              <a:buFontTx/>
+              <a:buNone/>
+              <a:defRPr/>
             </a:lvl4pPr>
             <a:lvl5pPr marL="1828800" indent="0">
-              <a:buNone/>
-              <a:defRPr sz="900"/>
+              <a:buFontTx/>
+              <a:buNone/>
+              <a:defRPr/>
             </a:lvl5pPr>
-            <a:lvl6pPr marL="2286000" indent="0">
-              <a:buNone/>
-              <a:defRPr sz="900"/>
-            </a:lvl6pPr>
-            <a:lvl7pPr marL="2743200" indent="0">
-              <a:buNone/>
-              <a:defRPr sz="900"/>
-            </a:lvl7pPr>
-            <a:lvl8pPr marL="3200400" indent="0">
-              <a:buNone/>
-              <a:defRPr sz="900"/>
-            </a:lvl8pPr>
-            <a:lvl9pPr marL="3657600" indent="0">
-              <a:buNone/>
-              <a:defRPr sz="900"/>
-            </a:lvl9pPr>
           </a:lstStyle>
           <a:p>
             <a:pPr lvl="0"/>
@@ -897,7 +731,7 @@
       </p:sp>
       <p:sp>
         <p:nvSpPr>
-          <p:cNvPr id="5" name="Date Placeholder 4"/>
+          <p:cNvPr id="3" name="Date Placeholder 2"/>
           <p:cNvSpPr>
             <a:spLocks noGrp="1"/>
           </p:cNvSpPr>
@@ -912,7 +746,7 @@
           <a:p>
             <a:fld id="{D406E69D-613E-4019-8533-7F772451DAA2}" type="datetimeFigureOut">
               <a:rPr lang="fr-CH" smtClean="0"/>
-              <a:t>11.02.2019</a:t>
+              <a:t>18.02.2019</a:t>
             </a:fld>
             <a:endParaRPr lang="fr-CH"/>
           </a:p>
@@ -920,7 +754,7 @@
       </p:sp>
       <p:sp>
         <p:nvSpPr>
-          <p:cNvPr id="6" name="Footer Placeholder 5"/>
+          <p:cNvPr id="4" name="Footer Placeholder 3"/>
           <p:cNvSpPr>
             <a:spLocks noGrp="1"/>
           </p:cNvSpPr>
@@ -939,7 +773,7 @@
       </p:sp>
       <p:sp>
         <p:nvSpPr>
-          <p:cNvPr id="7" name="Slide Number Placeholder 6"/>
+          <p:cNvPr id="5" name="Slide Number Placeholder 4"/>
           <p:cNvSpPr>
             <a:spLocks noGrp="1"/>
           </p:cNvSpPr>
@@ -963,7 +797,7 @@
     </p:spTree>
     <p:extLst>
       <p:ext uri="{BB962C8B-B14F-4D97-AF65-F5344CB8AC3E}">
-        <p14:creationId xmlns:p14="http://schemas.microsoft.com/office/powerpoint/2010/main" val="3390324388"/>
+        <p14:creationId xmlns:p14="http://schemas.microsoft.com/office/powerpoint/2010/main" val="3541543433"/>
       </p:ext>
     </p:extLst>
   </p:cSld>
@@ -1002,8 +836,8 @@
         </p:nvSpPr>
         <p:spPr>
           <a:xfrm>
-            <a:off x="1484312" y="685800"/>
-            <a:ext cx="10018711" cy="3048000"/>
+            <a:off x="684213" y="685800"/>
+            <a:ext cx="10058400" cy="2743200"/>
           </a:xfrm>
         </p:spPr>
         <p:txBody>
@@ -1011,8 +845,8 @@
             <a:normAutofit/>
           </a:bodyPr>
           <a:lstStyle>
-            <a:lvl1pPr algn="ctr">
-              <a:defRPr sz="3200" b="0" cap="none"/>
+            <a:lvl1pPr algn="l">
+              <a:defRPr sz="3200" b="0" cap="all"/>
             </a:lvl1pPr>
           </a:lstStyle>
           <a:p>
@@ -1036,8 +870,8 @@
         </p:nvSpPr>
         <p:spPr>
           <a:xfrm>
-            <a:off x="1484312" y="4343400"/>
-            <a:ext cx="10018713" cy="1447800"/>
+            <a:off x="684212" y="4114800"/>
+            <a:ext cx="8535988" cy="1879600"/>
           </a:xfrm>
         </p:spPr>
         <p:txBody>
@@ -1045,11 +879,13 @@
             <a:normAutofit/>
           </a:bodyPr>
           <a:lstStyle>
-            <a:lvl1pPr marL="0" indent="0" algn="ctr">
+            <a:lvl1pPr marL="0" indent="0" algn="l">
               <a:buNone/>
               <a:defRPr sz="2000">
                 <a:solidFill>
-                  <a:schemeClr val="tx1"/>
+                  <a:schemeClr val="bg2">
+                    <a:lumMod val="75000"/>
+                  </a:schemeClr>
                 </a:solidFill>
               </a:defRPr>
             </a:lvl1pPr>
@@ -1160,7 +996,7 @@
           <a:p>
             <a:fld id="{D406E69D-613E-4019-8533-7F772451DAA2}" type="datetimeFigureOut">
               <a:rPr lang="fr-CH" smtClean="0"/>
-              <a:t>11.02.2019</a:t>
+              <a:t>18.02.2019</a:t>
             </a:fld>
             <a:endParaRPr lang="fr-CH"/>
           </a:p>
@@ -1211,7 +1047,7 @@
     </p:spTree>
     <p:extLst>
       <p:ext uri="{BB962C8B-B14F-4D97-AF65-F5344CB8AC3E}">
-        <p14:creationId xmlns:p14="http://schemas.microsoft.com/office/powerpoint/2010/main" val="846734339"/>
+        <p14:creationId xmlns:p14="http://schemas.microsoft.com/office/powerpoint/2010/main" val="1861401746"/>
       </p:ext>
     </p:extLst>
   </p:cSld>
@@ -1240,13 +1076,291 @@
       </p:grpSpPr>
       <p:sp>
         <p:nvSpPr>
+          <p:cNvPr id="2" name="Title 1"/>
+          <p:cNvSpPr>
+            <a:spLocks noGrp="1"/>
+          </p:cNvSpPr>
+          <p:nvPr>
+            <p:ph type="title"/>
+          </p:nvPr>
+        </p:nvSpPr>
+        <p:spPr>
+          <a:xfrm>
+            <a:off x="1141411" y="685800"/>
+            <a:ext cx="9144001" cy="2743200"/>
+          </a:xfrm>
+        </p:spPr>
+        <p:txBody>
+          <a:bodyPr anchor="ctr">
+            <a:normAutofit/>
+          </a:bodyPr>
+          <a:lstStyle>
+            <a:lvl1pPr algn="l">
+              <a:defRPr sz="3200" b="0" cap="all">
+                <a:solidFill>
+                  <a:schemeClr val="tx1"/>
+                </a:solidFill>
+              </a:defRPr>
+            </a:lvl1pPr>
+          </a:lstStyle>
+          <a:p>
+            <a:r>
+              <a:rPr lang="en-US" smtClean="0"/>
+              <a:t>Click to edit Master title style</a:t>
+            </a:r>
+            <a:endParaRPr lang="en-US" dirty="0"/>
+          </a:p>
+        </p:txBody>
+      </p:sp>
+      <p:sp>
+        <p:nvSpPr>
+          <p:cNvPr id="10" name="Text Placeholder 9"/>
+          <p:cNvSpPr>
+            <a:spLocks noGrp="1"/>
+          </p:cNvSpPr>
+          <p:nvPr>
+            <p:ph type="body" sz="quarter" idx="13"/>
+          </p:nvPr>
+        </p:nvSpPr>
+        <p:spPr>
+          <a:xfrm>
+            <a:off x="1446212" y="3429000"/>
+            <a:ext cx="8534400" cy="381000"/>
+          </a:xfrm>
+        </p:spPr>
+        <p:txBody>
+          <a:bodyPr anchor="ctr"/>
+          <a:lstStyle>
+            <a:lvl1pPr marL="0" indent="0">
+              <a:buFontTx/>
+              <a:buNone/>
+              <a:defRPr/>
+            </a:lvl1pPr>
+            <a:lvl2pPr marL="457200" indent="0">
+              <a:buFontTx/>
+              <a:buNone/>
+              <a:defRPr/>
+            </a:lvl2pPr>
+            <a:lvl3pPr marL="914400" indent="0">
+              <a:buFontTx/>
+              <a:buNone/>
+              <a:defRPr/>
+            </a:lvl3pPr>
+            <a:lvl4pPr marL="1371600" indent="0">
+              <a:buFontTx/>
+              <a:buNone/>
+              <a:defRPr/>
+            </a:lvl4pPr>
+            <a:lvl5pPr marL="1828800" indent="0">
+              <a:buFontTx/>
+              <a:buNone/>
+              <a:defRPr/>
+            </a:lvl5pPr>
+          </a:lstStyle>
+          <a:p>
+            <a:pPr lvl="0"/>
+            <a:r>
+              <a:rPr lang="en-US" smtClean="0"/>
+              <a:t>Click to edit Master text styles</a:t>
+            </a:r>
+          </a:p>
+        </p:txBody>
+      </p:sp>
+      <p:sp>
+        <p:nvSpPr>
+          <p:cNvPr id="3" name="Text Placeholder 2"/>
+          <p:cNvSpPr>
+            <a:spLocks noGrp="1"/>
+          </p:cNvSpPr>
+          <p:nvPr>
+            <p:ph type="body" idx="1"/>
+          </p:nvPr>
+        </p:nvSpPr>
+        <p:spPr>
+          <a:xfrm>
+            <a:off x="684213" y="4301067"/>
+            <a:ext cx="8534400" cy="1684865"/>
+          </a:xfrm>
+        </p:spPr>
+        <p:txBody>
+          <a:bodyPr anchor="ctr">
+            <a:normAutofit/>
+          </a:bodyPr>
+          <a:lstStyle>
+            <a:lvl1pPr marL="0" indent="0" algn="l">
+              <a:buNone/>
+              <a:defRPr sz="2000">
+                <a:solidFill>
+                  <a:schemeClr val="bg2">
+                    <a:lumMod val="75000"/>
+                  </a:schemeClr>
+                </a:solidFill>
+              </a:defRPr>
+            </a:lvl1pPr>
+            <a:lvl2pPr marL="457200" indent="0">
+              <a:buNone/>
+              <a:defRPr sz="1800">
+                <a:solidFill>
+                  <a:schemeClr val="tx1">
+                    <a:tint val="75000"/>
+                  </a:schemeClr>
+                </a:solidFill>
+              </a:defRPr>
+            </a:lvl2pPr>
+            <a:lvl3pPr marL="914400" indent="0">
+              <a:buNone/>
+              <a:defRPr sz="1600">
+                <a:solidFill>
+                  <a:schemeClr val="tx1">
+                    <a:tint val="75000"/>
+                  </a:schemeClr>
+                </a:solidFill>
+              </a:defRPr>
+            </a:lvl3pPr>
+            <a:lvl4pPr marL="1371600" indent="0">
+              <a:buNone/>
+              <a:defRPr sz="1400">
+                <a:solidFill>
+                  <a:schemeClr val="tx1">
+                    <a:tint val="75000"/>
+                  </a:schemeClr>
+                </a:solidFill>
+              </a:defRPr>
+            </a:lvl4pPr>
+            <a:lvl5pPr marL="1828800" indent="0">
+              <a:buNone/>
+              <a:defRPr sz="1400">
+                <a:solidFill>
+                  <a:schemeClr val="tx1">
+                    <a:tint val="75000"/>
+                  </a:schemeClr>
+                </a:solidFill>
+              </a:defRPr>
+            </a:lvl5pPr>
+            <a:lvl6pPr marL="2286000" indent="0">
+              <a:buNone/>
+              <a:defRPr sz="1400">
+                <a:solidFill>
+                  <a:schemeClr val="tx1">
+                    <a:tint val="75000"/>
+                  </a:schemeClr>
+                </a:solidFill>
+              </a:defRPr>
+            </a:lvl6pPr>
+            <a:lvl7pPr marL="2743200" indent="0">
+              <a:buNone/>
+              <a:defRPr sz="1400">
+                <a:solidFill>
+                  <a:schemeClr val="tx1">
+                    <a:tint val="75000"/>
+                  </a:schemeClr>
+                </a:solidFill>
+              </a:defRPr>
+            </a:lvl7pPr>
+            <a:lvl8pPr marL="3200400" indent="0">
+              <a:buNone/>
+              <a:defRPr sz="1400">
+                <a:solidFill>
+                  <a:schemeClr val="tx1">
+                    <a:tint val="75000"/>
+                  </a:schemeClr>
+                </a:solidFill>
+              </a:defRPr>
+            </a:lvl8pPr>
+            <a:lvl9pPr marL="3657600" indent="0">
+              <a:buNone/>
+              <a:defRPr sz="1400">
+                <a:solidFill>
+                  <a:schemeClr val="tx1">
+                    <a:tint val="75000"/>
+                  </a:schemeClr>
+                </a:solidFill>
+              </a:defRPr>
+            </a:lvl9pPr>
+          </a:lstStyle>
+          <a:p>
+            <a:pPr lvl="0"/>
+            <a:r>
+              <a:rPr lang="en-US" smtClean="0"/>
+              <a:t>Click to edit Master text styles</a:t>
+            </a:r>
+          </a:p>
+        </p:txBody>
+      </p:sp>
+      <p:sp>
+        <p:nvSpPr>
+          <p:cNvPr id="4" name="Date Placeholder 3"/>
+          <p:cNvSpPr>
+            <a:spLocks noGrp="1"/>
+          </p:cNvSpPr>
+          <p:nvPr>
+            <p:ph type="dt" sz="half" idx="10"/>
+          </p:nvPr>
+        </p:nvSpPr>
+        <p:spPr/>
+        <p:txBody>
+          <a:bodyPr/>
+          <a:lstStyle/>
+          <a:p>
+            <a:fld id="{D406E69D-613E-4019-8533-7F772451DAA2}" type="datetimeFigureOut">
+              <a:rPr lang="fr-CH" smtClean="0"/>
+              <a:t>18.02.2019</a:t>
+            </a:fld>
+            <a:endParaRPr lang="fr-CH"/>
+          </a:p>
+        </p:txBody>
+      </p:sp>
+      <p:sp>
+        <p:nvSpPr>
+          <p:cNvPr id="5" name="Footer Placeholder 4"/>
+          <p:cNvSpPr>
+            <a:spLocks noGrp="1"/>
+          </p:cNvSpPr>
+          <p:nvPr>
+            <p:ph type="ftr" sz="quarter" idx="11"/>
+          </p:nvPr>
+        </p:nvSpPr>
+        <p:spPr/>
+        <p:txBody>
+          <a:bodyPr/>
+          <a:lstStyle/>
+          <a:p>
+            <a:endParaRPr lang="fr-CH"/>
+          </a:p>
+        </p:txBody>
+      </p:sp>
+      <p:sp>
+        <p:nvSpPr>
+          <p:cNvPr id="6" name="Slide Number Placeholder 5"/>
+          <p:cNvSpPr>
+            <a:spLocks noGrp="1"/>
+          </p:cNvSpPr>
+          <p:nvPr>
+            <p:ph type="sldNum" sz="quarter" idx="12"/>
+          </p:nvPr>
+        </p:nvSpPr>
+        <p:spPr/>
+        <p:txBody>
+          <a:bodyPr/>
+          <a:lstStyle/>
+          <a:p>
+            <a:fld id="{CE6FAF98-85C3-4CED-96AD-EC23129ABD35}" type="slidenum">
+              <a:rPr lang="fr-CH" smtClean="0"/>
+              <a:t>‹#›</a:t>
+            </a:fld>
+            <a:endParaRPr lang="fr-CH"/>
+          </a:p>
+        </p:txBody>
+      </p:sp>
+      <p:sp>
+        <p:nvSpPr>
           <p:cNvPr id="14" name="TextBox 13"/>
           <p:cNvSpPr txBox="1"/>
           <p:nvPr/>
         </p:nvSpPr>
         <p:spPr>
           <a:xfrm>
-            <a:off x="1598612" y="863023"/>
+            <a:off x="531812" y="812222"/>
             <a:ext cx="609600" cy="584776"/>
           </a:xfrm>
           <a:prstGeom prst="rect">
@@ -1257,89 +1371,7 @@
           <a:bodyPr vert="horz" lIns="91440" tIns="45720" rIns="91440" bIns="45720" rtlCol="0" anchor="ctr">
             <a:noAutofit/>
           </a:bodyPr>
-          <a:lstStyle>
-            <a:lvl1pPr>
-              <a:spcBef>
-                <a:spcPct val="0"/>
-              </a:spcBef>
-              <a:buNone/>
-              <a:defRPr sz="3200" b="0" cap="all">
-                <a:ln w="3175" cmpd="sng">
-                  <a:noFill/>
-                </a:ln>
-                <a:effectLst>
-                  <a:glow rad="38100">
-                    <a:schemeClr val="bg1">
-                      <a:lumMod val="65000"/>
-                      <a:lumOff val="35000"/>
-                      <a:alpha val="40000"/>
-                    </a:schemeClr>
-                  </a:glow>
-                  <a:outerShdw blurRad="28575" dist="38100" dir="14040000" algn="tl" rotWithShape="0">
-                    <a:srgbClr val="000000">
-                      <a:alpha val="25000"/>
-                    </a:srgbClr>
-                  </a:outerShdw>
-                </a:effectLst>
-              </a:defRPr>
-            </a:lvl1pPr>
-            <a:lvl2pPr>
-              <a:defRPr>
-                <a:solidFill>
-                  <a:schemeClr val="tx2"/>
-                </a:solidFill>
-              </a:defRPr>
-            </a:lvl2pPr>
-            <a:lvl3pPr>
-              <a:defRPr>
-                <a:solidFill>
-                  <a:schemeClr val="tx2"/>
-                </a:solidFill>
-              </a:defRPr>
-            </a:lvl3pPr>
-            <a:lvl4pPr>
-              <a:defRPr>
-                <a:solidFill>
-                  <a:schemeClr val="tx2"/>
-                </a:solidFill>
-              </a:defRPr>
-            </a:lvl4pPr>
-            <a:lvl5pPr>
-              <a:defRPr>
-                <a:solidFill>
-                  <a:schemeClr val="tx2"/>
-                </a:solidFill>
-              </a:defRPr>
-            </a:lvl5pPr>
-            <a:lvl6pPr>
-              <a:defRPr>
-                <a:solidFill>
-                  <a:schemeClr val="tx2"/>
-                </a:solidFill>
-              </a:defRPr>
-            </a:lvl6pPr>
-            <a:lvl7pPr>
-              <a:defRPr>
-                <a:solidFill>
-                  <a:schemeClr val="tx2"/>
-                </a:solidFill>
-              </a:defRPr>
-            </a:lvl7pPr>
-            <a:lvl8pPr>
-              <a:defRPr>
-                <a:solidFill>
-                  <a:schemeClr val="tx2"/>
-                </a:solidFill>
-              </a:defRPr>
-            </a:lvl8pPr>
-            <a:lvl9pPr>
-              <a:defRPr>
-                <a:solidFill>
-                  <a:schemeClr val="tx2"/>
-                </a:solidFill>
-              </a:defRPr>
-            </a:lvl9pPr>
-          </a:lstStyle>
+          <a:lstStyle/>
           <a:p>
             <a:pPr lvl="0"/>
             <a:r>
@@ -1362,7 +1394,7 @@
         </p:nvSpPr>
         <p:spPr>
           <a:xfrm>
-            <a:off x="10893425" y="2819399"/>
+            <a:off x="10285412" y="2768601"/>
             <a:ext cx="609600" cy="584776"/>
           </a:xfrm>
           <a:prstGeom prst="rect">
@@ -1373,89 +1405,7 @@
           <a:bodyPr vert="horz" lIns="91440" tIns="45720" rIns="91440" bIns="45720" rtlCol="0" anchor="ctr">
             <a:noAutofit/>
           </a:bodyPr>
-          <a:lstStyle>
-            <a:lvl1pPr>
-              <a:spcBef>
-                <a:spcPct val="0"/>
-              </a:spcBef>
-              <a:buNone/>
-              <a:defRPr sz="3200" b="0" cap="all">
-                <a:ln w="3175" cmpd="sng">
-                  <a:noFill/>
-                </a:ln>
-                <a:effectLst>
-                  <a:glow rad="38100">
-                    <a:schemeClr val="bg1">
-                      <a:lumMod val="65000"/>
-                      <a:lumOff val="35000"/>
-                      <a:alpha val="40000"/>
-                    </a:schemeClr>
-                  </a:glow>
-                  <a:outerShdw blurRad="28575" dist="38100" dir="14040000" algn="tl" rotWithShape="0">
-                    <a:srgbClr val="000000">
-                      <a:alpha val="25000"/>
-                    </a:srgbClr>
-                  </a:outerShdw>
-                </a:effectLst>
-              </a:defRPr>
-            </a:lvl1pPr>
-            <a:lvl2pPr>
-              <a:defRPr>
-                <a:solidFill>
-                  <a:schemeClr val="tx2"/>
-                </a:solidFill>
-              </a:defRPr>
-            </a:lvl2pPr>
-            <a:lvl3pPr>
-              <a:defRPr>
-                <a:solidFill>
-                  <a:schemeClr val="tx2"/>
-                </a:solidFill>
-              </a:defRPr>
-            </a:lvl3pPr>
-            <a:lvl4pPr>
-              <a:defRPr>
-                <a:solidFill>
-                  <a:schemeClr val="tx2"/>
-                </a:solidFill>
-              </a:defRPr>
-            </a:lvl4pPr>
-            <a:lvl5pPr>
-              <a:defRPr>
-                <a:solidFill>
-                  <a:schemeClr val="tx2"/>
-                </a:solidFill>
-              </a:defRPr>
-            </a:lvl5pPr>
-            <a:lvl6pPr>
-              <a:defRPr>
-                <a:solidFill>
-                  <a:schemeClr val="tx2"/>
-                </a:solidFill>
-              </a:defRPr>
-            </a:lvl6pPr>
-            <a:lvl7pPr>
-              <a:defRPr>
-                <a:solidFill>
-                  <a:schemeClr val="tx2"/>
-                </a:solidFill>
-              </a:defRPr>
-            </a:lvl7pPr>
-            <a:lvl8pPr>
-              <a:defRPr>
-                <a:solidFill>
-                  <a:schemeClr val="tx2"/>
-                </a:solidFill>
-              </a:defRPr>
-            </a:lvl8pPr>
-            <a:lvl9pPr>
-              <a:defRPr>
-                <a:solidFill>
-                  <a:schemeClr val="tx2"/>
-                </a:solidFill>
-              </a:defRPr>
-            </a:lvl9pPr>
-          </a:lstStyle>
+          <a:lstStyle/>
           <a:p>
             <a:pPr lvl="0" algn="r"/>
             <a:r>
@@ -1470,288 +1420,10 @@
           </a:p>
         </p:txBody>
       </p:sp>
-      <p:sp>
-        <p:nvSpPr>
-          <p:cNvPr id="2" name="Title 1"/>
-          <p:cNvSpPr>
-            <a:spLocks noGrp="1"/>
-          </p:cNvSpPr>
-          <p:nvPr>
-            <p:ph type="title"/>
-          </p:nvPr>
-        </p:nvSpPr>
-        <p:spPr>
-          <a:xfrm>
-            <a:off x="2208212" y="685800"/>
-            <a:ext cx="8990012" cy="2743199"/>
-          </a:xfrm>
-        </p:spPr>
-        <p:txBody>
-          <a:bodyPr anchor="ctr">
-            <a:normAutofit/>
-          </a:bodyPr>
-          <a:lstStyle>
-            <a:lvl1pPr algn="ctr">
-              <a:defRPr sz="3200" b="0" cap="none">
-                <a:solidFill>
-                  <a:schemeClr val="tx1"/>
-                </a:solidFill>
-              </a:defRPr>
-            </a:lvl1pPr>
-          </a:lstStyle>
-          <a:p>
-            <a:r>
-              <a:rPr lang="en-US" smtClean="0"/>
-              <a:t>Click to edit Master title style</a:t>
-            </a:r>
-            <a:endParaRPr lang="en-US" dirty="0"/>
-          </a:p>
-        </p:txBody>
-      </p:sp>
-      <p:sp>
-        <p:nvSpPr>
-          <p:cNvPr id="10" name="Text Placeholder 9"/>
-          <p:cNvSpPr>
-            <a:spLocks noGrp="1"/>
-          </p:cNvSpPr>
-          <p:nvPr>
-            <p:ph type="body" sz="quarter" idx="13"/>
-          </p:nvPr>
-        </p:nvSpPr>
-        <p:spPr>
-          <a:xfrm>
-            <a:off x="2436811" y="3428999"/>
-            <a:ext cx="8532815" cy="381000"/>
-          </a:xfrm>
-        </p:spPr>
-        <p:txBody>
-          <a:bodyPr anchor="ctr">
-            <a:normAutofit/>
-          </a:bodyPr>
-          <a:lstStyle>
-            <a:lvl1pPr marL="0" indent="0">
-              <a:buFontTx/>
-              <a:buNone/>
-              <a:defRPr sz="1800"/>
-            </a:lvl1pPr>
-            <a:lvl2pPr marL="457200" indent="0">
-              <a:buFontTx/>
-              <a:buNone/>
-              <a:defRPr/>
-            </a:lvl2pPr>
-            <a:lvl3pPr marL="914400" indent="0">
-              <a:buFontTx/>
-              <a:buNone/>
-              <a:defRPr/>
-            </a:lvl3pPr>
-            <a:lvl4pPr marL="1371600" indent="0">
-              <a:buFontTx/>
-              <a:buNone/>
-              <a:defRPr/>
-            </a:lvl4pPr>
-            <a:lvl5pPr marL="1828800" indent="0">
-              <a:buFontTx/>
-              <a:buNone/>
-              <a:defRPr/>
-            </a:lvl5pPr>
-          </a:lstStyle>
-          <a:p>
-            <a:pPr lvl="0"/>
-            <a:r>
-              <a:rPr lang="en-US" smtClean="0"/>
-              <a:t>Click to edit Master text styles</a:t>
-            </a:r>
-          </a:p>
-        </p:txBody>
-      </p:sp>
-      <p:sp>
-        <p:nvSpPr>
-          <p:cNvPr id="3" name="Text Placeholder 2"/>
-          <p:cNvSpPr>
-            <a:spLocks noGrp="1"/>
-          </p:cNvSpPr>
-          <p:nvPr>
-            <p:ph type="body" idx="1"/>
-          </p:nvPr>
-        </p:nvSpPr>
-        <p:spPr>
-          <a:xfrm>
-            <a:off x="1484311" y="4343400"/>
-            <a:ext cx="10018711" cy="1447800"/>
-          </a:xfrm>
-        </p:spPr>
-        <p:txBody>
-          <a:bodyPr anchor="ctr">
-            <a:normAutofit/>
-          </a:bodyPr>
-          <a:lstStyle>
-            <a:lvl1pPr marL="0" indent="0" algn="ctr">
-              <a:buNone/>
-              <a:defRPr sz="2000">
-                <a:solidFill>
-                  <a:schemeClr val="tx1"/>
-                </a:solidFill>
-              </a:defRPr>
-            </a:lvl1pPr>
-            <a:lvl2pPr marL="457200" indent="0">
-              <a:buNone/>
-              <a:defRPr sz="1800">
-                <a:solidFill>
-                  <a:schemeClr val="tx1">
-                    <a:tint val="75000"/>
-                  </a:schemeClr>
-                </a:solidFill>
-              </a:defRPr>
-            </a:lvl2pPr>
-            <a:lvl3pPr marL="914400" indent="0">
-              <a:buNone/>
-              <a:defRPr sz="1600">
-                <a:solidFill>
-                  <a:schemeClr val="tx1">
-                    <a:tint val="75000"/>
-                  </a:schemeClr>
-                </a:solidFill>
-              </a:defRPr>
-            </a:lvl3pPr>
-            <a:lvl4pPr marL="1371600" indent="0">
-              <a:buNone/>
-              <a:defRPr sz="1400">
-                <a:solidFill>
-                  <a:schemeClr val="tx1">
-                    <a:tint val="75000"/>
-                  </a:schemeClr>
-                </a:solidFill>
-              </a:defRPr>
-            </a:lvl4pPr>
-            <a:lvl5pPr marL="1828800" indent="0">
-              <a:buNone/>
-              <a:defRPr sz="1400">
-                <a:solidFill>
-                  <a:schemeClr val="tx1">
-                    <a:tint val="75000"/>
-                  </a:schemeClr>
-                </a:solidFill>
-              </a:defRPr>
-            </a:lvl5pPr>
-            <a:lvl6pPr marL="2286000" indent="0">
-              <a:buNone/>
-              <a:defRPr sz="1400">
-                <a:solidFill>
-                  <a:schemeClr val="tx1">
-                    <a:tint val="75000"/>
-                  </a:schemeClr>
-                </a:solidFill>
-              </a:defRPr>
-            </a:lvl6pPr>
-            <a:lvl7pPr marL="2743200" indent="0">
-              <a:buNone/>
-              <a:defRPr sz="1400">
-                <a:solidFill>
-                  <a:schemeClr val="tx1">
-                    <a:tint val="75000"/>
-                  </a:schemeClr>
-                </a:solidFill>
-              </a:defRPr>
-            </a:lvl7pPr>
-            <a:lvl8pPr marL="3200400" indent="0">
-              <a:buNone/>
-              <a:defRPr sz="1400">
-                <a:solidFill>
-                  <a:schemeClr val="tx1">
-                    <a:tint val="75000"/>
-                  </a:schemeClr>
-                </a:solidFill>
-              </a:defRPr>
-            </a:lvl8pPr>
-            <a:lvl9pPr marL="3657600" indent="0">
-              <a:buNone/>
-              <a:defRPr sz="1400">
-                <a:solidFill>
-                  <a:schemeClr val="tx1">
-                    <a:tint val="75000"/>
-                  </a:schemeClr>
-                </a:solidFill>
-              </a:defRPr>
-            </a:lvl9pPr>
-          </a:lstStyle>
-          <a:p>
-            <a:pPr lvl="0"/>
-            <a:r>
-              <a:rPr lang="en-US" smtClean="0"/>
-              <a:t>Click to edit Master text styles</a:t>
-            </a:r>
-          </a:p>
-        </p:txBody>
-      </p:sp>
-      <p:sp>
-        <p:nvSpPr>
-          <p:cNvPr id="4" name="Date Placeholder 3"/>
-          <p:cNvSpPr>
-            <a:spLocks noGrp="1"/>
-          </p:cNvSpPr>
-          <p:nvPr>
-            <p:ph type="dt" sz="half" idx="10"/>
-          </p:nvPr>
-        </p:nvSpPr>
-        <p:spPr/>
-        <p:txBody>
-          <a:bodyPr/>
-          <a:lstStyle/>
-          <a:p>
-            <a:fld id="{D406E69D-613E-4019-8533-7F772451DAA2}" type="datetimeFigureOut">
-              <a:rPr lang="fr-CH" smtClean="0"/>
-              <a:t>11.02.2019</a:t>
-            </a:fld>
-            <a:endParaRPr lang="fr-CH"/>
-          </a:p>
-        </p:txBody>
-      </p:sp>
-      <p:sp>
-        <p:nvSpPr>
-          <p:cNvPr id="5" name="Footer Placeholder 4"/>
-          <p:cNvSpPr>
-            <a:spLocks noGrp="1"/>
-          </p:cNvSpPr>
-          <p:nvPr>
-            <p:ph type="ftr" sz="quarter" idx="11"/>
-          </p:nvPr>
-        </p:nvSpPr>
-        <p:spPr/>
-        <p:txBody>
-          <a:bodyPr/>
-          <a:lstStyle/>
-          <a:p>
-            <a:endParaRPr lang="fr-CH"/>
-          </a:p>
-        </p:txBody>
-      </p:sp>
-      <p:sp>
-        <p:nvSpPr>
-          <p:cNvPr id="6" name="Slide Number Placeholder 5"/>
-          <p:cNvSpPr>
-            <a:spLocks noGrp="1"/>
-          </p:cNvSpPr>
-          <p:nvPr>
-            <p:ph type="sldNum" sz="quarter" idx="12"/>
-          </p:nvPr>
-        </p:nvSpPr>
-        <p:spPr/>
-        <p:txBody>
-          <a:bodyPr/>
-          <a:lstStyle/>
-          <a:p>
-            <a:fld id="{CE6FAF98-85C3-4CED-96AD-EC23129ABD35}" type="slidenum">
-              <a:rPr lang="fr-CH" smtClean="0"/>
-              <a:t>‹#›</a:t>
-            </a:fld>
-            <a:endParaRPr lang="fr-CH"/>
-          </a:p>
-        </p:txBody>
-      </p:sp>
     </p:spTree>
     <p:extLst>
       <p:ext uri="{BB962C8B-B14F-4D97-AF65-F5344CB8AC3E}">
-        <p14:creationId xmlns:p14="http://schemas.microsoft.com/office/powerpoint/2010/main" val="1084790381"/>
+        <p14:creationId xmlns:p14="http://schemas.microsoft.com/office/powerpoint/2010/main" val="3054885713"/>
       </p:ext>
     </p:extLst>
   </p:cSld>
@@ -1790,8 +1462,8 @@
         </p:nvSpPr>
         <p:spPr>
           <a:xfrm>
-            <a:off x="1484313" y="3308581"/>
-            <a:ext cx="10018709" cy="1468800"/>
+            <a:off x="684212" y="3429000"/>
+            <a:ext cx="8534400" cy="1697400"/>
           </a:xfrm>
         </p:spPr>
         <p:txBody>
@@ -1799,8 +1471,8 @@
             <a:normAutofit/>
           </a:bodyPr>
           <a:lstStyle>
-            <a:lvl1pPr algn="r">
-              <a:defRPr sz="3200" b="0" cap="none"/>
+            <a:lvl1pPr algn="l">
+              <a:defRPr sz="3200" b="0" cap="all"/>
             </a:lvl1pPr>
           </a:lstStyle>
           <a:p>
@@ -1824,8 +1496,8 @@
         </p:nvSpPr>
         <p:spPr>
           <a:xfrm>
-            <a:off x="1484312" y="4777381"/>
-            <a:ext cx="10018710" cy="860400"/>
+            <a:off x="684211" y="5132981"/>
+            <a:ext cx="8535990" cy="860400"/>
           </a:xfrm>
         </p:spPr>
         <p:txBody>
@@ -1833,11 +1505,13 @@
             <a:normAutofit/>
           </a:bodyPr>
           <a:lstStyle>
-            <a:lvl1pPr marL="0" indent="0" algn="r">
+            <a:lvl1pPr marL="0" indent="0" algn="l">
               <a:buNone/>
               <a:defRPr sz="2000">
                 <a:solidFill>
-                  <a:schemeClr val="tx1"/>
+                  <a:schemeClr val="bg2">
+                    <a:lumMod val="75000"/>
+                  </a:schemeClr>
                 </a:solidFill>
               </a:defRPr>
             </a:lvl1pPr>
@@ -1948,7 +1622,7 @@
           <a:p>
             <a:fld id="{D406E69D-613E-4019-8533-7F772451DAA2}" type="datetimeFigureOut">
               <a:rPr lang="fr-CH" smtClean="0"/>
-              <a:t>11.02.2019</a:t>
+              <a:t>18.02.2019</a:t>
             </a:fld>
             <a:endParaRPr lang="fr-CH"/>
           </a:p>
@@ -1999,7 +1673,7 @@
     </p:spTree>
     <p:extLst>
       <p:ext uri="{BB962C8B-B14F-4D97-AF65-F5344CB8AC3E}">
-        <p14:creationId xmlns:p14="http://schemas.microsoft.com/office/powerpoint/2010/main" val="3088559983"/>
+        <p14:creationId xmlns:p14="http://schemas.microsoft.com/office/powerpoint/2010/main" val="2308896072"/>
       </p:ext>
     </p:extLst>
   </p:cSld>
@@ -2028,13 +1702,285 @@
       </p:grpSpPr>
       <p:sp>
         <p:nvSpPr>
-          <p:cNvPr id="14" name="TextBox 13"/>
+          <p:cNvPr id="2" name="Title 1"/>
+          <p:cNvSpPr>
+            <a:spLocks noGrp="1"/>
+          </p:cNvSpPr>
+          <p:nvPr>
+            <p:ph type="title"/>
+          </p:nvPr>
+        </p:nvSpPr>
+        <p:spPr>
+          <a:xfrm>
+            <a:off x="1141413" y="685800"/>
+            <a:ext cx="9144000" cy="2743200"/>
+          </a:xfrm>
+        </p:spPr>
+        <p:txBody>
+          <a:bodyPr anchor="ctr">
+            <a:normAutofit/>
+          </a:bodyPr>
+          <a:lstStyle>
+            <a:lvl1pPr algn="l">
+              <a:defRPr sz="3200" b="0" cap="all">
+                <a:solidFill>
+                  <a:schemeClr val="tx1"/>
+                </a:solidFill>
+              </a:defRPr>
+            </a:lvl1pPr>
+          </a:lstStyle>
+          <a:p>
+            <a:r>
+              <a:rPr lang="en-US" smtClean="0"/>
+              <a:t>Click to edit Master title style</a:t>
+            </a:r>
+            <a:endParaRPr lang="en-US" dirty="0"/>
+          </a:p>
+        </p:txBody>
+      </p:sp>
+      <p:sp>
+        <p:nvSpPr>
+          <p:cNvPr id="10" name="Text Placeholder 9"/>
+          <p:cNvSpPr>
+            <a:spLocks noGrp="1"/>
+          </p:cNvSpPr>
+          <p:nvPr>
+            <p:ph type="body" sz="quarter" idx="13"/>
+          </p:nvPr>
+        </p:nvSpPr>
+        <p:spPr>
+          <a:xfrm>
+            <a:off x="684212" y="3928534"/>
+            <a:ext cx="8534401" cy="1049866"/>
+          </a:xfrm>
+        </p:spPr>
+        <p:txBody>
+          <a:bodyPr vert="horz" lIns="91440" tIns="45720" rIns="91440" bIns="45720" rtlCol="0" anchor="b">
+            <a:normAutofit/>
+          </a:bodyPr>
+          <a:lstStyle>
+            <a:lvl1pPr>
+              <a:buNone/>
+              <a:defRPr lang="en-US" sz="2400" b="0" cap="all" dirty="0">
+                <a:ln w="3175" cmpd="sng">
+                  <a:noFill/>
+                </a:ln>
+                <a:solidFill>
+                  <a:schemeClr val="tx1"/>
+                </a:solidFill>
+                <a:effectLst/>
+              </a:defRPr>
+            </a:lvl1pPr>
+          </a:lstStyle>
+          <a:p>
+            <a:pPr marL="0" lvl="0">
+              <a:spcBef>
+                <a:spcPct val="0"/>
+              </a:spcBef>
+              <a:buNone/>
+            </a:pPr>
+            <a:r>
+              <a:rPr lang="en-US" smtClean="0"/>
+              <a:t>Click to edit Master text styles</a:t>
+            </a:r>
+          </a:p>
+        </p:txBody>
+      </p:sp>
+      <p:sp>
+        <p:nvSpPr>
+          <p:cNvPr id="3" name="Text Placeholder 2"/>
+          <p:cNvSpPr>
+            <a:spLocks noGrp="1"/>
+          </p:cNvSpPr>
+          <p:nvPr>
+            <p:ph type="body" idx="1"/>
+          </p:nvPr>
+        </p:nvSpPr>
+        <p:spPr>
+          <a:xfrm>
+            <a:off x="684211" y="4978400"/>
+            <a:ext cx="8534401" cy="1016000"/>
+          </a:xfrm>
+        </p:spPr>
+        <p:txBody>
+          <a:bodyPr anchor="t">
+            <a:normAutofit/>
+          </a:bodyPr>
+          <a:lstStyle>
+            <a:lvl1pPr marL="0" indent="0" algn="l">
+              <a:buNone/>
+              <a:defRPr sz="1800">
+                <a:solidFill>
+                  <a:schemeClr val="bg2">
+                    <a:lumMod val="75000"/>
+                  </a:schemeClr>
+                </a:solidFill>
+              </a:defRPr>
+            </a:lvl1pPr>
+            <a:lvl2pPr marL="457200" indent="0">
+              <a:buNone/>
+              <a:defRPr sz="1800">
+                <a:solidFill>
+                  <a:schemeClr val="tx1">
+                    <a:tint val="75000"/>
+                  </a:schemeClr>
+                </a:solidFill>
+              </a:defRPr>
+            </a:lvl2pPr>
+            <a:lvl3pPr marL="914400" indent="0">
+              <a:buNone/>
+              <a:defRPr sz="1600">
+                <a:solidFill>
+                  <a:schemeClr val="tx1">
+                    <a:tint val="75000"/>
+                  </a:schemeClr>
+                </a:solidFill>
+              </a:defRPr>
+            </a:lvl3pPr>
+            <a:lvl4pPr marL="1371600" indent="0">
+              <a:buNone/>
+              <a:defRPr sz="1400">
+                <a:solidFill>
+                  <a:schemeClr val="tx1">
+                    <a:tint val="75000"/>
+                  </a:schemeClr>
+                </a:solidFill>
+              </a:defRPr>
+            </a:lvl4pPr>
+            <a:lvl5pPr marL="1828800" indent="0">
+              <a:buNone/>
+              <a:defRPr sz="1400">
+                <a:solidFill>
+                  <a:schemeClr val="tx1">
+                    <a:tint val="75000"/>
+                  </a:schemeClr>
+                </a:solidFill>
+              </a:defRPr>
+            </a:lvl5pPr>
+            <a:lvl6pPr marL="2286000" indent="0">
+              <a:buNone/>
+              <a:defRPr sz="1400">
+                <a:solidFill>
+                  <a:schemeClr val="tx1">
+                    <a:tint val="75000"/>
+                  </a:schemeClr>
+                </a:solidFill>
+              </a:defRPr>
+            </a:lvl6pPr>
+            <a:lvl7pPr marL="2743200" indent="0">
+              <a:buNone/>
+              <a:defRPr sz="1400">
+                <a:solidFill>
+                  <a:schemeClr val="tx1">
+                    <a:tint val="75000"/>
+                  </a:schemeClr>
+                </a:solidFill>
+              </a:defRPr>
+            </a:lvl7pPr>
+            <a:lvl8pPr marL="3200400" indent="0">
+              <a:buNone/>
+              <a:defRPr sz="1400">
+                <a:solidFill>
+                  <a:schemeClr val="tx1">
+                    <a:tint val="75000"/>
+                  </a:schemeClr>
+                </a:solidFill>
+              </a:defRPr>
+            </a:lvl8pPr>
+            <a:lvl9pPr marL="3657600" indent="0">
+              <a:buNone/>
+              <a:defRPr sz="1400">
+                <a:solidFill>
+                  <a:schemeClr val="tx1">
+                    <a:tint val="75000"/>
+                  </a:schemeClr>
+                </a:solidFill>
+              </a:defRPr>
+            </a:lvl9pPr>
+          </a:lstStyle>
+          <a:p>
+            <a:pPr lvl="0"/>
+            <a:r>
+              <a:rPr lang="en-US" smtClean="0"/>
+              <a:t>Click to edit Master text styles</a:t>
+            </a:r>
+          </a:p>
+        </p:txBody>
+      </p:sp>
+      <p:sp>
+        <p:nvSpPr>
+          <p:cNvPr id="4" name="Date Placeholder 3"/>
+          <p:cNvSpPr>
+            <a:spLocks noGrp="1"/>
+          </p:cNvSpPr>
+          <p:nvPr>
+            <p:ph type="dt" sz="half" idx="10"/>
+          </p:nvPr>
+        </p:nvSpPr>
+        <p:spPr/>
+        <p:txBody>
+          <a:bodyPr/>
+          <a:lstStyle/>
+          <a:p>
+            <a:fld id="{D406E69D-613E-4019-8533-7F772451DAA2}" type="datetimeFigureOut">
+              <a:rPr lang="fr-CH" smtClean="0"/>
+              <a:t>18.02.2019</a:t>
+            </a:fld>
+            <a:endParaRPr lang="fr-CH"/>
+          </a:p>
+        </p:txBody>
+      </p:sp>
+      <p:sp>
+        <p:nvSpPr>
+          <p:cNvPr id="5" name="Footer Placeholder 4"/>
+          <p:cNvSpPr>
+            <a:spLocks noGrp="1"/>
+          </p:cNvSpPr>
+          <p:nvPr>
+            <p:ph type="ftr" sz="quarter" idx="11"/>
+          </p:nvPr>
+        </p:nvSpPr>
+        <p:spPr/>
+        <p:txBody>
+          <a:bodyPr/>
+          <a:lstStyle/>
+          <a:p>
+            <a:endParaRPr lang="fr-CH"/>
+          </a:p>
+        </p:txBody>
+      </p:sp>
+      <p:sp>
+        <p:nvSpPr>
+          <p:cNvPr id="6" name="Slide Number Placeholder 5"/>
+          <p:cNvSpPr>
+            <a:spLocks noGrp="1"/>
+          </p:cNvSpPr>
+          <p:nvPr>
+            <p:ph type="sldNum" sz="quarter" idx="12"/>
+          </p:nvPr>
+        </p:nvSpPr>
+        <p:spPr/>
+        <p:txBody>
+          <a:bodyPr/>
+          <a:lstStyle/>
+          <a:p>
+            <a:fld id="{CE6FAF98-85C3-4CED-96AD-EC23129ABD35}" type="slidenum">
+              <a:rPr lang="fr-CH" smtClean="0"/>
+              <a:t>‹#›</a:t>
+            </a:fld>
+            <a:endParaRPr lang="fr-CH"/>
+          </a:p>
+        </p:txBody>
+      </p:sp>
+      <p:sp>
+        <p:nvSpPr>
+          <p:cNvPr id="11" name="TextBox 10"/>
           <p:cNvSpPr txBox="1"/>
           <p:nvPr/>
         </p:nvSpPr>
         <p:spPr>
           <a:xfrm>
-            <a:off x="1598612" y="863023"/>
+            <a:off x="531812" y="812222"/>
             <a:ext cx="609600" cy="584776"/>
           </a:xfrm>
           <a:prstGeom prst="rect">
@@ -2045,89 +1991,7 @@
           <a:bodyPr vert="horz" lIns="91440" tIns="45720" rIns="91440" bIns="45720" rtlCol="0" anchor="ctr">
             <a:noAutofit/>
           </a:bodyPr>
-          <a:lstStyle>
-            <a:lvl1pPr>
-              <a:spcBef>
-                <a:spcPct val="0"/>
-              </a:spcBef>
-              <a:buNone/>
-              <a:defRPr sz="3200" b="0" cap="all">
-                <a:ln w="3175" cmpd="sng">
-                  <a:noFill/>
-                </a:ln>
-                <a:effectLst>
-                  <a:glow rad="38100">
-                    <a:schemeClr val="bg1">
-                      <a:lumMod val="65000"/>
-                      <a:lumOff val="35000"/>
-                      <a:alpha val="40000"/>
-                    </a:schemeClr>
-                  </a:glow>
-                  <a:outerShdw blurRad="28575" dist="38100" dir="14040000" algn="tl" rotWithShape="0">
-                    <a:srgbClr val="000000">
-                      <a:alpha val="25000"/>
-                    </a:srgbClr>
-                  </a:outerShdw>
-                </a:effectLst>
-              </a:defRPr>
-            </a:lvl1pPr>
-            <a:lvl2pPr>
-              <a:defRPr>
-                <a:solidFill>
-                  <a:schemeClr val="tx2"/>
-                </a:solidFill>
-              </a:defRPr>
-            </a:lvl2pPr>
-            <a:lvl3pPr>
-              <a:defRPr>
-                <a:solidFill>
-                  <a:schemeClr val="tx2"/>
-                </a:solidFill>
-              </a:defRPr>
-            </a:lvl3pPr>
-            <a:lvl4pPr>
-              <a:defRPr>
-                <a:solidFill>
-                  <a:schemeClr val="tx2"/>
-                </a:solidFill>
-              </a:defRPr>
-            </a:lvl4pPr>
-            <a:lvl5pPr>
-              <a:defRPr>
-                <a:solidFill>
-                  <a:schemeClr val="tx2"/>
-                </a:solidFill>
-              </a:defRPr>
-            </a:lvl5pPr>
-            <a:lvl6pPr>
-              <a:defRPr>
-                <a:solidFill>
-                  <a:schemeClr val="tx2"/>
-                </a:solidFill>
-              </a:defRPr>
-            </a:lvl6pPr>
-            <a:lvl7pPr>
-              <a:defRPr>
-                <a:solidFill>
-                  <a:schemeClr val="tx2"/>
-                </a:solidFill>
-              </a:defRPr>
-            </a:lvl7pPr>
-            <a:lvl8pPr>
-              <a:defRPr>
-                <a:solidFill>
-                  <a:schemeClr val="tx2"/>
-                </a:solidFill>
-              </a:defRPr>
-            </a:lvl8pPr>
-            <a:lvl9pPr>
-              <a:defRPr>
-                <a:solidFill>
-                  <a:schemeClr val="tx2"/>
-                </a:solidFill>
-              </a:defRPr>
-            </a:lvl9pPr>
-          </a:lstStyle>
+          <a:lstStyle/>
           <a:p>
             <a:pPr lvl="0"/>
             <a:r>
@@ -2144,13 +2008,13 @@
       </p:sp>
       <p:sp>
         <p:nvSpPr>
-          <p:cNvPr id="15" name="TextBox 14"/>
+          <p:cNvPr id="12" name="TextBox 11"/>
           <p:cNvSpPr txBox="1"/>
           <p:nvPr/>
         </p:nvSpPr>
         <p:spPr>
           <a:xfrm>
-            <a:off x="10893425" y="2819399"/>
+            <a:off x="10285412" y="2768601"/>
             <a:ext cx="609600" cy="584776"/>
           </a:xfrm>
           <a:prstGeom prst="rect">
@@ -2161,89 +2025,7 @@
           <a:bodyPr vert="horz" lIns="91440" tIns="45720" rIns="91440" bIns="45720" rtlCol="0" anchor="ctr">
             <a:noAutofit/>
           </a:bodyPr>
-          <a:lstStyle>
-            <a:lvl1pPr>
-              <a:spcBef>
-                <a:spcPct val="0"/>
-              </a:spcBef>
-              <a:buNone/>
-              <a:defRPr sz="3200" b="0" cap="all">
-                <a:ln w="3175" cmpd="sng">
-                  <a:noFill/>
-                </a:ln>
-                <a:effectLst>
-                  <a:glow rad="38100">
-                    <a:schemeClr val="bg1">
-                      <a:lumMod val="65000"/>
-                      <a:lumOff val="35000"/>
-                      <a:alpha val="40000"/>
-                    </a:schemeClr>
-                  </a:glow>
-                  <a:outerShdw blurRad="28575" dist="38100" dir="14040000" algn="tl" rotWithShape="0">
-                    <a:srgbClr val="000000">
-                      <a:alpha val="25000"/>
-                    </a:srgbClr>
-                  </a:outerShdw>
-                </a:effectLst>
-              </a:defRPr>
-            </a:lvl1pPr>
-            <a:lvl2pPr>
-              <a:defRPr>
-                <a:solidFill>
-                  <a:schemeClr val="tx2"/>
-                </a:solidFill>
-              </a:defRPr>
-            </a:lvl2pPr>
-            <a:lvl3pPr>
-              <a:defRPr>
-                <a:solidFill>
-                  <a:schemeClr val="tx2"/>
-                </a:solidFill>
-              </a:defRPr>
-            </a:lvl3pPr>
-            <a:lvl4pPr>
-              <a:defRPr>
-                <a:solidFill>
-                  <a:schemeClr val="tx2"/>
-                </a:solidFill>
-              </a:defRPr>
-            </a:lvl4pPr>
-            <a:lvl5pPr>
-              <a:defRPr>
-                <a:solidFill>
-                  <a:schemeClr val="tx2"/>
-                </a:solidFill>
-              </a:defRPr>
-            </a:lvl5pPr>
-            <a:lvl6pPr>
-              <a:defRPr>
-                <a:solidFill>
-                  <a:schemeClr val="tx2"/>
-                </a:solidFill>
-              </a:defRPr>
-            </a:lvl6pPr>
-            <a:lvl7pPr>
-              <a:defRPr>
-                <a:solidFill>
-                  <a:schemeClr val="tx2"/>
-                </a:solidFill>
-              </a:defRPr>
-            </a:lvl7pPr>
-            <a:lvl8pPr>
-              <a:defRPr>
-                <a:solidFill>
-                  <a:schemeClr val="tx2"/>
-                </a:solidFill>
-              </a:defRPr>
-            </a:lvl8pPr>
-            <a:lvl9pPr>
-              <a:defRPr>
-                <a:solidFill>
-                  <a:schemeClr val="tx2"/>
-                </a:solidFill>
-              </a:defRPr>
-            </a:lvl9pPr>
-          </a:lstStyle>
+          <a:lstStyle/>
           <a:p>
             <a:pPr lvl="0" algn="r"/>
             <a:r>
@@ -2258,280 +2040,10 @@
           </a:p>
         </p:txBody>
       </p:sp>
-      <p:sp>
-        <p:nvSpPr>
-          <p:cNvPr id="2" name="Title 1"/>
-          <p:cNvSpPr>
-            <a:spLocks noGrp="1"/>
-          </p:cNvSpPr>
-          <p:nvPr>
-            <p:ph type="title"/>
-          </p:nvPr>
-        </p:nvSpPr>
-        <p:spPr>
-          <a:xfrm>
-            <a:off x="2208212" y="685800"/>
-            <a:ext cx="8990012" cy="2743199"/>
-          </a:xfrm>
-        </p:spPr>
-        <p:txBody>
-          <a:bodyPr anchor="ctr">
-            <a:normAutofit/>
-          </a:bodyPr>
-          <a:lstStyle>
-            <a:lvl1pPr algn="ctr">
-              <a:defRPr sz="3200" b="0" cap="none">
-                <a:solidFill>
-                  <a:schemeClr val="tx1"/>
-                </a:solidFill>
-              </a:defRPr>
-            </a:lvl1pPr>
-          </a:lstStyle>
-          <a:p>
-            <a:r>
-              <a:rPr lang="en-US" smtClean="0"/>
-              <a:t>Click to edit Master title style</a:t>
-            </a:r>
-            <a:endParaRPr lang="en-US" dirty="0"/>
-          </a:p>
-        </p:txBody>
-      </p:sp>
-      <p:sp>
-        <p:nvSpPr>
-          <p:cNvPr id="10" name="Text Placeholder 9"/>
-          <p:cNvSpPr>
-            <a:spLocks noGrp="1"/>
-          </p:cNvSpPr>
-          <p:nvPr>
-            <p:ph type="body" sz="quarter" idx="13"/>
-          </p:nvPr>
-        </p:nvSpPr>
-        <p:spPr>
-          <a:xfrm>
-            <a:off x="1484313" y="3886200"/>
-            <a:ext cx="10018710" cy="889000"/>
-          </a:xfrm>
-        </p:spPr>
-        <p:txBody>
-          <a:bodyPr vert="horz" lIns="91440" tIns="45720" rIns="91440" bIns="45720" rtlCol="0" anchor="b">
-            <a:normAutofit/>
-          </a:bodyPr>
-          <a:lstStyle>
-            <a:lvl1pPr algn="r">
-              <a:buNone/>
-              <a:defRPr lang="en-US" sz="2400" b="0" cap="none" dirty="0">
-                <a:ln w="3175" cmpd="sng">
-                  <a:noFill/>
-                </a:ln>
-                <a:solidFill>
-                  <a:schemeClr val="tx1"/>
-                </a:solidFill>
-                <a:effectLst/>
-              </a:defRPr>
-            </a:lvl1pPr>
-          </a:lstStyle>
-          <a:p>
-            <a:pPr marL="0" lvl="0">
-              <a:spcBef>
-                <a:spcPct val="0"/>
-              </a:spcBef>
-              <a:buNone/>
-            </a:pPr>
-            <a:r>
-              <a:rPr lang="en-US" smtClean="0"/>
-              <a:t>Click to edit Master text styles</a:t>
-            </a:r>
-          </a:p>
-        </p:txBody>
-      </p:sp>
-      <p:sp>
-        <p:nvSpPr>
-          <p:cNvPr id="3" name="Text Placeholder 2"/>
-          <p:cNvSpPr>
-            <a:spLocks noGrp="1"/>
-          </p:cNvSpPr>
-          <p:nvPr>
-            <p:ph type="body" idx="1"/>
-          </p:nvPr>
-        </p:nvSpPr>
-        <p:spPr>
-          <a:xfrm>
-            <a:off x="1484312" y="4775200"/>
-            <a:ext cx="10018710" cy="1016000"/>
-          </a:xfrm>
-        </p:spPr>
-        <p:txBody>
-          <a:bodyPr anchor="t">
-            <a:normAutofit/>
-          </a:bodyPr>
-          <a:lstStyle>
-            <a:lvl1pPr marL="0" indent="0" algn="r">
-              <a:buNone/>
-              <a:defRPr sz="1800">
-                <a:solidFill>
-                  <a:schemeClr val="tx1"/>
-                </a:solidFill>
-              </a:defRPr>
-            </a:lvl1pPr>
-            <a:lvl2pPr marL="457200" indent="0">
-              <a:buNone/>
-              <a:defRPr sz="1800">
-                <a:solidFill>
-                  <a:schemeClr val="tx1">
-                    <a:tint val="75000"/>
-                  </a:schemeClr>
-                </a:solidFill>
-              </a:defRPr>
-            </a:lvl2pPr>
-            <a:lvl3pPr marL="914400" indent="0">
-              <a:buNone/>
-              <a:defRPr sz="1600">
-                <a:solidFill>
-                  <a:schemeClr val="tx1">
-                    <a:tint val="75000"/>
-                  </a:schemeClr>
-                </a:solidFill>
-              </a:defRPr>
-            </a:lvl3pPr>
-            <a:lvl4pPr marL="1371600" indent="0">
-              <a:buNone/>
-              <a:defRPr sz="1400">
-                <a:solidFill>
-                  <a:schemeClr val="tx1">
-                    <a:tint val="75000"/>
-                  </a:schemeClr>
-                </a:solidFill>
-              </a:defRPr>
-            </a:lvl4pPr>
-            <a:lvl5pPr marL="1828800" indent="0">
-              <a:buNone/>
-              <a:defRPr sz="1400">
-                <a:solidFill>
-                  <a:schemeClr val="tx1">
-                    <a:tint val="75000"/>
-                  </a:schemeClr>
-                </a:solidFill>
-              </a:defRPr>
-            </a:lvl5pPr>
-            <a:lvl6pPr marL="2286000" indent="0">
-              <a:buNone/>
-              <a:defRPr sz="1400">
-                <a:solidFill>
-                  <a:schemeClr val="tx1">
-                    <a:tint val="75000"/>
-                  </a:schemeClr>
-                </a:solidFill>
-              </a:defRPr>
-            </a:lvl6pPr>
-            <a:lvl7pPr marL="2743200" indent="0">
-              <a:buNone/>
-              <a:defRPr sz="1400">
-                <a:solidFill>
-                  <a:schemeClr val="tx1">
-                    <a:tint val="75000"/>
-                  </a:schemeClr>
-                </a:solidFill>
-              </a:defRPr>
-            </a:lvl7pPr>
-            <a:lvl8pPr marL="3200400" indent="0">
-              <a:buNone/>
-              <a:defRPr sz="1400">
-                <a:solidFill>
-                  <a:schemeClr val="tx1">
-                    <a:tint val="75000"/>
-                  </a:schemeClr>
-                </a:solidFill>
-              </a:defRPr>
-            </a:lvl8pPr>
-            <a:lvl9pPr marL="3657600" indent="0">
-              <a:buNone/>
-              <a:defRPr sz="1400">
-                <a:solidFill>
-                  <a:schemeClr val="tx1">
-                    <a:tint val="75000"/>
-                  </a:schemeClr>
-                </a:solidFill>
-              </a:defRPr>
-            </a:lvl9pPr>
-          </a:lstStyle>
-          <a:p>
-            <a:pPr lvl="0"/>
-            <a:r>
-              <a:rPr lang="en-US" smtClean="0"/>
-              <a:t>Click to edit Master text styles</a:t>
-            </a:r>
-          </a:p>
-        </p:txBody>
-      </p:sp>
-      <p:sp>
-        <p:nvSpPr>
-          <p:cNvPr id="4" name="Date Placeholder 3"/>
-          <p:cNvSpPr>
-            <a:spLocks noGrp="1"/>
-          </p:cNvSpPr>
-          <p:nvPr>
-            <p:ph type="dt" sz="half" idx="10"/>
-          </p:nvPr>
-        </p:nvSpPr>
-        <p:spPr/>
-        <p:txBody>
-          <a:bodyPr/>
-          <a:lstStyle/>
-          <a:p>
-            <a:fld id="{D406E69D-613E-4019-8533-7F772451DAA2}" type="datetimeFigureOut">
-              <a:rPr lang="fr-CH" smtClean="0"/>
-              <a:t>11.02.2019</a:t>
-            </a:fld>
-            <a:endParaRPr lang="fr-CH"/>
-          </a:p>
-        </p:txBody>
-      </p:sp>
-      <p:sp>
-        <p:nvSpPr>
-          <p:cNvPr id="5" name="Footer Placeholder 4"/>
-          <p:cNvSpPr>
-            <a:spLocks noGrp="1"/>
-          </p:cNvSpPr>
-          <p:nvPr>
-            <p:ph type="ftr" sz="quarter" idx="11"/>
-          </p:nvPr>
-        </p:nvSpPr>
-        <p:spPr/>
-        <p:txBody>
-          <a:bodyPr/>
-          <a:lstStyle/>
-          <a:p>
-            <a:endParaRPr lang="fr-CH"/>
-          </a:p>
-        </p:txBody>
-      </p:sp>
-      <p:sp>
-        <p:nvSpPr>
-          <p:cNvPr id="6" name="Slide Number Placeholder 5"/>
-          <p:cNvSpPr>
-            <a:spLocks noGrp="1"/>
-          </p:cNvSpPr>
-          <p:nvPr>
-            <p:ph type="sldNum" sz="quarter" idx="12"/>
-          </p:nvPr>
-        </p:nvSpPr>
-        <p:spPr/>
-        <p:txBody>
-          <a:bodyPr/>
-          <a:lstStyle/>
-          <a:p>
-            <a:fld id="{CE6FAF98-85C3-4CED-96AD-EC23129ABD35}" type="slidenum">
-              <a:rPr lang="fr-CH" smtClean="0"/>
-              <a:t>‹#›</a:t>
-            </a:fld>
-            <a:endParaRPr lang="fr-CH"/>
-          </a:p>
-        </p:txBody>
-      </p:sp>
     </p:spTree>
     <p:extLst>
       <p:ext uri="{BB962C8B-B14F-4D97-AF65-F5344CB8AC3E}">
-        <p14:creationId xmlns:p14="http://schemas.microsoft.com/office/powerpoint/2010/main" val="578092600"/>
+        <p14:creationId xmlns:p14="http://schemas.microsoft.com/office/powerpoint/2010/main" val="3070239577"/>
       </p:ext>
     </p:extLst>
   </p:cSld>
@@ -2570,8 +2082,8 @@
         </p:nvSpPr>
         <p:spPr>
           <a:xfrm>
-            <a:off x="1484313" y="685800"/>
-            <a:ext cx="10018712" cy="2727325"/>
+            <a:off x="684213" y="685800"/>
+            <a:ext cx="10058400" cy="2743200"/>
           </a:xfrm>
         </p:spPr>
         <p:txBody>
@@ -2605,8 +2117,8 @@
         </p:nvSpPr>
         <p:spPr>
           <a:xfrm>
-            <a:off x="1484312" y="3505200"/>
-            <a:ext cx="10018713" cy="838200"/>
+            <a:off x="684212" y="3928534"/>
+            <a:ext cx="8534400" cy="838200"/>
           </a:xfrm>
         </p:spPr>
         <p:txBody>
@@ -2616,7 +2128,7 @@
           <a:lstStyle>
             <a:lvl1pPr>
               <a:buNone/>
-              <a:defRPr lang="en-US" sz="2800" b="0" cap="none" dirty="0">
+              <a:defRPr lang="en-US" sz="2400" b="0" cap="all" dirty="0">
                 <a:ln w="3175" cmpd="sng">
                   <a:noFill/>
                 </a:ln>
@@ -2653,8 +2165,8 @@
         </p:nvSpPr>
         <p:spPr>
           <a:xfrm>
-            <a:off x="1484311" y="4343400"/>
-            <a:ext cx="10018713" cy="1447800"/>
+            <a:off x="684211" y="4766732"/>
+            <a:ext cx="8534401" cy="1227667"/>
           </a:xfrm>
         </p:spPr>
         <p:txBody>
@@ -2666,7 +2178,9 @@
               <a:buNone/>
               <a:defRPr sz="1800">
                 <a:solidFill>
-                  <a:schemeClr val="tx1"/>
+                  <a:schemeClr val="bg2">
+                    <a:lumMod val="75000"/>
+                  </a:schemeClr>
                 </a:solidFill>
               </a:defRPr>
             </a:lvl1pPr>
@@ -2777,7 +2291,7 @@
           <a:p>
             <a:fld id="{D406E69D-613E-4019-8533-7F772451DAA2}" type="datetimeFigureOut">
               <a:rPr lang="fr-CH" smtClean="0"/>
-              <a:t>11.02.2019</a:t>
+              <a:t>18.02.2019</a:t>
             </a:fld>
             <a:endParaRPr lang="fr-CH"/>
           </a:p>
@@ -2828,7 +2342,7 @@
     </p:spTree>
     <p:extLst>
       <p:ext uri="{BB962C8B-B14F-4D97-AF65-F5344CB8AC3E}">
-        <p14:creationId xmlns:p14="http://schemas.microsoft.com/office/powerpoint/2010/main" val="3168804492"/>
+        <p14:creationId xmlns:p14="http://schemas.microsoft.com/office/powerpoint/2010/main" val="4071806649"/>
       </p:ext>
     </p:extLst>
   </p:cSld>
@@ -2869,7 +2383,7 @@
         <p:txBody>
           <a:bodyPr/>
           <a:lstStyle>
-            <a:lvl1pPr algn="ctr">
+            <a:lvl1pPr algn="l">
               <a:defRPr/>
             </a:lvl1pPr>
           </a:lstStyle>
@@ -2951,7 +2465,7 @@
           <a:p>
             <a:fld id="{D406E69D-613E-4019-8533-7F772451DAA2}" type="datetimeFigureOut">
               <a:rPr lang="fr-CH" smtClean="0"/>
-              <a:t>11.02.2019</a:t>
+              <a:t>18.02.2019</a:t>
             </a:fld>
             <a:endParaRPr lang="fr-CH"/>
           </a:p>
@@ -3002,7 +2516,7 @@
     </p:spTree>
     <p:extLst>
       <p:ext uri="{BB962C8B-B14F-4D97-AF65-F5344CB8AC3E}">
-        <p14:creationId xmlns:p14="http://schemas.microsoft.com/office/powerpoint/2010/main" val="3714663939"/>
+        <p14:creationId xmlns:p14="http://schemas.microsoft.com/office/powerpoint/2010/main" val="327604107"/>
       </p:ext>
     </p:extLst>
   </p:cSld>
@@ -3041,8 +2555,8 @@
         </p:nvSpPr>
         <p:spPr>
           <a:xfrm>
-            <a:off x="9732655" y="685800"/>
-            <a:ext cx="1770369" cy="5105400"/>
+            <a:off x="8685212" y="685800"/>
+            <a:ext cx="2057400" cy="4572000"/>
           </a:xfrm>
         </p:spPr>
         <p:txBody>
@@ -3069,8 +2583,8 @@
         </p:nvSpPr>
         <p:spPr>
           <a:xfrm>
-            <a:off x="1484312" y="685800"/>
-            <a:ext cx="8019742" cy="5105400"/>
+            <a:off x="685800" y="685800"/>
+            <a:ext cx="7823200" cy="5308600"/>
           </a:xfrm>
         </p:spPr>
         <p:txBody>
@@ -3131,7 +2645,7 @@
           <a:p>
             <a:fld id="{D406E69D-613E-4019-8533-7F772451DAA2}" type="datetimeFigureOut">
               <a:rPr lang="fr-CH" smtClean="0"/>
-              <a:t>11.02.2019</a:t>
+              <a:t>18.02.2019</a:t>
             </a:fld>
             <a:endParaRPr lang="fr-CH"/>
           </a:p>
@@ -3182,7 +2696,7 @@
     </p:spTree>
     <p:extLst>
       <p:ext uri="{BB962C8B-B14F-4D97-AF65-F5344CB8AC3E}">
-        <p14:creationId xmlns:p14="http://schemas.microsoft.com/office/powerpoint/2010/main" val="2511825056"/>
+        <p14:creationId xmlns:p14="http://schemas.microsoft.com/office/powerpoint/2010/main" val="4257934728"/>
       </p:ext>
     </p:extLst>
   </p:cSld>
@@ -3301,7 +2815,7 @@
           <a:p>
             <a:fld id="{D406E69D-613E-4019-8533-7F772451DAA2}" type="datetimeFigureOut">
               <a:rPr lang="fr-CH" smtClean="0"/>
-              <a:t>11.02.2019</a:t>
+              <a:t>18.02.2019</a:t>
             </a:fld>
             <a:endParaRPr lang="fr-CH"/>
           </a:p>
@@ -3336,12 +2850,7 @@
             <p:ph type="sldNum" sz="quarter" idx="12"/>
           </p:nvPr>
         </p:nvSpPr>
-        <p:spPr>
-          <a:xfrm>
-            <a:off x="10951856" y="5867131"/>
-            <a:ext cx="551167" cy="365125"/>
-          </a:xfrm>
-        </p:spPr>
+        <p:spPr/>
         <p:txBody>
           <a:bodyPr/>
           <a:lstStyle/>
@@ -3357,7 +2866,7 @@
     </p:spTree>
     <p:extLst>
       <p:ext uri="{BB962C8B-B14F-4D97-AF65-F5344CB8AC3E}">
-        <p14:creationId xmlns:p14="http://schemas.microsoft.com/office/powerpoint/2010/main" val="1986505644"/>
+        <p14:creationId xmlns:p14="http://schemas.microsoft.com/office/powerpoint/2010/main" val="1356064523"/>
       </p:ext>
     </p:extLst>
   </p:cSld>
@@ -3396,15 +2905,17 @@
         </p:nvSpPr>
         <p:spPr>
           <a:xfrm>
-            <a:off x="2572279" y="2666999"/>
-            <a:ext cx="8930747" cy="2110382"/>
+            <a:off x="684211" y="2006600"/>
+            <a:ext cx="8534401" cy="2281600"/>
           </a:xfrm>
         </p:spPr>
         <p:txBody>
-          <a:bodyPr anchor="b"/>
+          <a:bodyPr anchor="b">
+            <a:normAutofit/>
+          </a:bodyPr>
           <a:lstStyle>
-            <a:lvl1pPr algn="r">
-              <a:defRPr sz="4000" b="0" cap="none"/>
+            <a:lvl1pPr algn="l">
+              <a:defRPr sz="3600" b="0" cap="all"/>
             </a:lvl1pPr>
           </a:lstStyle>
           <a:p>
@@ -3428,8 +2939,8 @@
         </p:nvSpPr>
         <p:spPr>
           <a:xfrm>
-            <a:off x="2572278" y="4777381"/>
-            <a:ext cx="8930748" cy="860400"/>
+            <a:off x="684213" y="4495800"/>
+            <a:ext cx="8534400" cy="1498600"/>
           </a:xfrm>
         </p:spPr>
         <p:txBody>
@@ -3437,11 +2948,13 @@
             <a:normAutofit/>
           </a:bodyPr>
           <a:lstStyle>
-            <a:lvl1pPr marL="0" indent="0" algn="r">
-              <a:buNone/>
-              <a:defRPr sz="2000">
-                <a:solidFill>
-                  <a:schemeClr val="tx1"/>
+            <a:lvl1pPr marL="0" indent="0" algn="l">
+              <a:buNone/>
+              <a:defRPr sz="1800">
+                <a:solidFill>
+                  <a:schemeClr val="bg2">
+                    <a:lumMod val="75000"/>
+                  </a:schemeClr>
                 </a:solidFill>
               </a:defRPr>
             </a:lvl1pPr>
@@ -3552,7 +3065,7 @@
           <a:p>
             <a:fld id="{D406E69D-613E-4019-8533-7F772451DAA2}" type="datetimeFigureOut">
               <a:rPr lang="fr-CH" smtClean="0"/>
-              <a:t>11.02.2019</a:t>
+              <a:t>18.02.2019</a:t>
             </a:fld>
             <a:endParaRPr lang="fr-CH"/>
           </a:p>
@@ -3603,7 +3116,7 @@
     </p:spTree>
     <p:extLst>
       <p:ext uri="{BB962C8B-B14F-4D97-AF65-F5344CB8AC3E}">
-        <p14:creationId xmlns:p14="http://schemas.microsoft.com/office/powerpoint/2010/main" val="3271703506"/>
+        <p14:creationId xmlns:p14="http://schemas.microsoft.com/office/powerpoint/2010/main" val="219080503"/>
       </p:ext>
     </p:extLst>
   </p:cSld>
@@ -3640,73 +3153,40 @@
             <p:ph type="title"/>
           </p:nvPr>
         </p:nvSpPr>
+        <p:spPr/>
+        <p:txBody>
+          <a:bodyPr/>
+          <a:lstStyle/>
+          <a:p>
+            <a:r>
+              <a:rPr lang="en-US" smtClean="0"/>
+              <a:t>Click to edit Master title style</a:t>
+            </a:r>
+            <a:endParaRPr lang="en-US" dirty="0"/>
+          </a:p>
+        </p:txBody>
+      </p:sp>
+      <p:sp>
+        <p:nvSpPr>
+          <p:cNvPr id="3" name="Content Placeholder 2"/>
+          <p:cNvSpPr>
+            <a:spLocks noGrp="1"/>
+          </p:cNvSpPr>
+          <p:nvPr>
+            <p:ph sz="half" idx="1"/>
+          </p:nvPr>
+        </p:nvSpPr>
         <p:spPr>
           <a:xfrm>
-            <a:off x="1484311" y="685800"/>
-            <a:ext cx="10018713" cy="1752599"/>
-          </a:xfrm>
-        </p:spPr>
-        <p:txBody>
-          <a:bodyPr/>
-          <a:lstStyle/>
-          <a:p>
-            <a:r>
-              <a:rPr lang="en-US" smtClean="0"/>
-              <a:t>Click to edit Master title style</a:t>
-            </a:r>
-            <a:endParaRPr lang="en-US" dirty="0"/>
-          </a:p>
-        </p:txBody>
-      </p:sp>
-      <p:sp>
-        <p:nvSpPr>
-          <p:cNvPr id="3" name="Content Placeholder 2"/>
-          <p:cNvSpPr>
-            <a:spLocks noGrp="1"/>
-          </p:cNvSpPr>
-          <p:nvPr>
-            <p:ph sz="half" idx="1"/>
-          </p:nvPr>
-        </p:nvSpPr>
-        <p:spPr>
-          <a:xfrm>
-            <a:off x="1484312" y="2666999"/>
-            <a:ext cx="4895055" cy="3124201"/>
+            <a:off x="684211" y="685800"/>
+            <a:ext cx="4937655" cy="3615267"/>
           </a:xfrm>
         </p:spPr>
         <p:txBody>
           <a:bodyPr>
             <a:normAutofit/>
           </a:bodyPr>
-          <a:lstStyle>
-            <a:lvl1pPr>
-              <a:defRPr sz="1800"/>
-            </a:lvl1pPr>
-            <a:lvl2pPr>
-              <a:defRPr sz="1600"/>
-            </a:lvl2pPr>
-            <a:lvl3pPr>
-              <a:defRPr sz="1400"/>
-            </a:lvl3pPr>
-            <a:lvl4pPr>
-              <a:defRPr sz="1200"/>
-            </a:lvl4pPr>
-            <a:lvl5pPr>
-              <a:defRPr sz="1200"/>
-            </a:lvl5pPr>
-            <a:lvl6pPr>
-              <a:defRPr sz="1200"/>
-            </a:lvl6pPr>
-            <a:lvl7pPr>
-              <a:defRPr sz="1200"/>
-            </a:lvl7pPr>
-            <a:lvl8pPr>
-              <a:defRPr sz="1200"/>
-            </a:lvl8pPr>
-            <a:lvl9pPr>
-              <a:defRPr sz="1200"/>
-            </a:lvl9pPr>
-          </a:lstStyle>
+          <a:lstStyle/>
           <a:p>
             <a:pPr lvl="0"/>
             <a:r>
@@ -3757,43 +3237,15 @@
         </p:nvSpPr>
         <p:spPr>
           <a:xfrm>
-            <a:off x="6607967" y="2667000"/>
-            <a:ext cx="4895056" cy="3124200"/>
+            <a:off x="5808133" y="685801"/>
+            <a:ext cx="4934479" cy="3615266"/>
           </a:xfrm>
         </p:spPr>
         <p:txBody>
           <a:bodyPr>
             <a:normAutofit/>
           </a:bodyPr>
-          <a:lstStyle>
-            <a:lvl1pPr>
-              <a:defRPr sz="1800"/>
-            </a:lvl1pPr>
-            <a:lvl2pPr>
-              <a:defRPr sz="1600"/>
-            </a:lvl2pPr>
-            <a:lvl3pPr>
-              <a:defRPr sz="1400"/>
-            </a:lvl3pPr>
-            <a:lvl4pPr>
-              <a:defRPr sz="1200"/>
-            </a:lvl4pPr>
-            <a:lvl5pPr>
-              <a:defRPr sz="1200"/>
-            </a:lvl5pPr>
-            <a:lvl6pPr>
-              <a:defRPr sz="1200"/>
-            </a:lvl6pPr>
-            <a:lvl7pPr>
-              <a:defRPr sz="1200"/>
-            </a:lvl7pPr>
-            <a:lvl8pPr>
-              <a:defRPr sz="1200"/>
-            </a:lvl8pPr>
-            <a:lvl9pPr>
-              <a:defRPr sz="1200"/>
-            </a:lvl9pPr>
-          </a:lstStyle>
+          <a:lstStyle/>
           <a:p>
             <a:pPr lvl="0"/>
             <a:r>
@@ -3849,7 +3301,7 @@
           <a:p>
             <a:fld id="{D406E69D-613E-4019-8533-7F772451DAA2}" type="datetimeFigureOut">
               <a:rPr lang="fr-CH" smtClean="0"/>
-              <a:t>11.02.2019</a:t>
+              <a:t>18.02.2019</a:t>
             </a:fld>
             <a:endParaRPr lang="fr-CH"/>
           </a:p>
@@ -3900,7 +3352,7 @@
     </p:spTree>
     <p:extLst>
       <p:ext uri="{BB962C8B-B14F-4D97-AF65-F5344CB8AC3E}">
-        <p14:creationId xmlns:p14="http://schemas.microsoft.com/office/powerpoint/2010/main" val="3717205345"/>
+        <p14:creationId xmlns:p14="http://schemas.microsoft.com/office/powerpoint/2010/main" val="3228570120"/>
       </p:ext>
     </p:extLst>
   </p:cSld>
@@ -3966,8 +3418,8 @@
         </p:nvSpPr>
         <p:spPr>
           <a:xfrm>
-            <a:off x="1772179" y="2658533"/>
-            <a:ext cx="4607188" cy="576262"/>
+            <a:off x="972080" y="685800"/>
+            <a:ext cx="4649787" cy="576262"/>
           </a:xfrm>
         </p:spPr>
         <p:txBody>
@@ -3979,9 +3431,7 @@
               <a:buNone/>
               <a:defRPr sz="2800" b="0">
                 <a:solidFill>
-                  <a:schemeClr val="accent1">
-                    <a:lumMod val="75000"/>
-                  </a:schemeClr>
+                  <a:schemeClr val="tx1"/>
                 </a:solidFill>
               </a:defRPr>
             </a:lvl1pPr>
@@ -4039,43 +3489,15 @@
         </p:nvSpPr>
         <p:spPr>
           <a:xfrm>
-            <a:off x="1484311" y="3335337"/>
-            <a:ext cx="4895056" cy="2455862"/>
+            <a:off x="684211" y="1270529"/>
+            <a:ext cx="4937655" cy="3030538"/>
           </a:xfrm>
         </p:spPr>
         <p:txBody>
           <a:bodyPr anchor="t">
             <a:normAutofit/>
           </a:bodyPr>
-          <a:lstStyle>
-            <a:lvl1pPr>
-              <a:defRPr sz="1800"/>
-            </a:lvl1pPr>
-            <a:lvl2pPr>
-              <a:defRPr sz="1600"/>
-            </a:lvl2pPr>
-            <a:lvl3pPr>
-              <a:defRPr sz="1400"/>
-            </a:lvl3pPr>
-            <a:lvl4pPr>
-              <a:defRPr sz="1200"/>
-            </a:lvl4pPr>
-            <a:lvl5pPr>
-              <a:defRPr sz="1200"/>
-            </a:lvl5pPr>
-            <a:lvl6pPr>
-              <a:defRPr sz="1200"/>
-            </a:lvl6pPr>
-            <a:lvl7pPr>
-              <a:defRPr sz="1200"/>
-            </a:lvl7pPr>
-            <a:lvl8pPr>
-              <a:defRPr sz="1200"/>
-            </a:lvl8pPr>
-            <a:lvl9pPr>
-              <a:defRPr sz="1200"/>
-            </a:lvl9pPr>
-          </a:lstStyle>
+          <a:lstStyle/>
           <a:p>
             <a:pPr lvl="0"/>
             <a:r>
@@ -4126,8 +3548,8 @@
         </p:nvSpPr>
         <p:spPr>
           <a:xfrm>
-            <a:off x="6880487" y="2667000"/>
-            <a:ext cx="4622537" cy="576262"/>
+            <a:off x="6079066" y="685800"/>
+            <a:ext cx="4665134" cy="576262"/>
           </a:xfrm>
         </p:spPr>
         <p:txBody>
@@ -4139,9 +3561,7 @@
               <a:buNone/>
               <a:defRPr sz="2800" b="0">
                 <a:solidFill>
-                  <a:schemeClr val="accent1">
-                    <a:lumMod val="75000"/>
-                  </a:schemeClr>
+                  <a:schemeClr val="tx1"/>
                 </a:solidFill>
               </a:defRPr>
             </a:lvl1pPr>
@@ -4199,43 +3619,15 @@
         </p:nvSpPr>
         <p:spPr>
           <a:xfrm>
-            <a:off x="6607967" y="3335337"/>
-            <a:ext cx="4895056" cy="2455862"/>
+            <a:off x="5806545" y="1262062"/>
+            <a:ext cx="4929188" cy="3030538"/>
           </a:xfrm>
         </p:spPr>
         <p:txBody>
           <a:bodyPr anchor="t">
             <a:normAutofit/>
           </a:bodyPr>
-          <a:lstStyle>
-            <a:lvl1pPr>
-              <a:defRPr sz="1800"/>
-            </a:lvl1pPr>
-            <a:lvl2pPr>
-              <a:defRPr sz="1600"/>
-            </a:lvl2pPr>
-            <a:lvl3pPr>
-              <a:defRPr sz="1400"/>
-            </a:lvl3pPr>
-            <a:lvl4pPr>
-              <a:defRPr sz="1200"/>
-            </a:lvl4pPr>
-            <a:lvl5pPr>
-              <a:defRPr sz="1200"/>
-            </a:lvl5pPr>
-            <a:lvl6pPr>
-              <a:defRPr sz="1200"/>
-            </a:lvl6pPr>
-            <a:lvl7pPr>
-              <a:defRPr sz="1200"/>
-            </a:lvl7pPr>
-            <a:lvl8pPr>
-              <a:defRPr sz="1200"/>
-            </a:lvl8pPr>
-            <a:lvl9pPr>
-              <a:defRPr sz="1200"/>
-            </a:lvl9pPr>
-          </a:lstStyle>
+          <a:lstStyle/>
           <a:p>
             <a:pPr lvl="0"/>
             <a:r>
@@ -4291,7 +3683,7 @@
           <a:p>
             <a:fld id="{D406E69D-613E-4019-8533-7F772451DAA2}" type="datetimeFigureOut">
               <a:rPr lang="fr-CH" smtClean="0"/>
-              <a:t>11.02.2019</a:t>
+              <a:t>18.02.2019</a:t>
             </a:fld>
             <a:endParaRPr lang="fr-CH"/>
           </a:p>
@@ -4342,7 +3734,7 @@
     </p:spTree>
     <p:extLst>
       <p:ext uri="{BB962C8B-B14F-4D97-AF65-F5344CB8AC3E}">
-        <p14:creationId xmlns:p14="http://schemas.microsoft.com/office/powerpoint/2010/main" val="340996035"/>
+        <p14:creationId xmlns:p14="http://schemas.microsoft.com/office/powerpoint/2010/main" val="2952533347"/>
       </p:ext>
     </p:extLst>
   </p:cSld>
@@ -4409,7 +3801,7 @@
           <a:p>
             <a:fld id="{D406E69D-613E-4019-8533-7F772451DAA2}" type="datetimeFigureOut">
               <a:rPr lang="fr-CH" smtClean="0"/>
-              <a:t>11.02.2019</a:t>
+              <a:t>18.02.2019</a:t>
             </a:fld>
             <a:endParaRPr lang="fr-CH"/>
           </a:p>
@@ -4460,7 +3852,7 @@
     </p:spTree>
     <p:extLst>
       <p:ext uri="{BB962C8B-B14F-4D97-AF65-F5344CB8AC3E}">
-        <p14:creationId xmlns:p14="http://schemas.microsoft.com/office/powerpoint/2010/main" val="2889374680"/>
+        <p14:creationId xmlns:p14="http://schemas.microsoft.com/office/powerpoint/2010/main" val="1361129074"/>
       </p:ext>
     </p:extLst>
   </p:cSld>
@@ -4504,7 +3896,7 @@
           <a:p>
             <a:fld id="{D406E69D-613E-4019-8533-7F772451DAA2}" type="datetimeFigureOut">
               <a:rPr lang="fr-CH" smtClean="0"/>
-              <a:t>11.02.2019</a:t>
+              <a:t>18.02.2019</a:t>
             </a:fld>
             <a:endParaRPr lang="fr-CH"/>
           </a:p>
@@ -4555,7 +3947,7 @@
     </p:spTree>
     <p:extLst>
       <p:ext uri="{BB962C8B-B14F-4D97-AF65-F5344CB8AC3E}">
-        <p14:creationId xmlns:p14="http://schemas.microsoft.com/office/powerpoint/2010/main" val="295228812"/>
+        <p14:creationId xmlns:p14="http://schemas.microsoft.com/office/powerpoint/2010/main" val="4221684146"/>
       </p:ext>
     </p:extLst>
   </p:cSld>
@@ -4594,8 +3986,8 @@
         </p:nvSpPr>
         <p:spPr>
           <a:xfrm>
-            <a:off x="1484312" y="1600200"/>
-            <a:ext cx="3549121" cy="1371600"/>
+            <a:off x="7085012" y="685800"/>
+            <a:ext cx="3657600" cy="1371600"/>
           </a:xfrm>
         </p:spPr>
         <p:txBody>
@@ -4603,7 +3995,7 @@
             <a:normAutofit/>
           </a:bodyPr>
           <a:lstStyle>
-            <a:lvl1pPr algn="ctr">
+            <a:lvl1pPr algn="l">
               <a:defRPr sz="2400" b="0"/>
             </a:lvl1pPr>
           </a:lstStyle>
@@ -4628,43 +4020,15 @@
         </p:nvSpPr>
         <p:spPr>
           <a:xfrm>
-            <a:off x="5262033" y="685799"/>
-            <a:ext cx="6240990" cy="5105401"/>
+            <a:off x="684212" y="685800"/>
+            <a:ext cx="5943601" cy="5308600"/>
           </a:xfrm>
         </p:spPr>
         <p:txBody>
           <a:bodyPr anchor="ctr">
             <a:normAutofit/>
           </a:bodyPr>
-          <a:lstStyle>
-            <a:lvl1pPr>
-              <a:defRPr sz="2000"/>
-            </a:lvl1pPr>
-            <a:lvl2pPr>
-              <a:defRPr sz="1800"/>
-            </a:lvl2pPr>
-            <a:lvl3pPr>
-              <a:defRPr sz="1600"/>
-            </a:lvl3pPr>
-            <a:lvl4pPr>
-              <a:defRPr sz="1400"/>
-            </a:lvl4pPr>
-            <a:lvl5pPr>
-              <a:defRPr sz="1400"/>
-            </a:lvl5pPr>
-            <a:lvl6pPr>
-              <a:defRPr sz="1400"/>
-            </a:lvl6pPr>
-            <a:lvl7pPr>
-              <a:defRPr sz="1400"/>
-            </a:lvl7pPr>
-            <a:lvl8pPr>
-              <a:defRPr sz="1400"/>
-            </a:lvl8pPr>
-            <a:lvl9pPr>
-              <a:defRPr sz="1400"/>
-            </a:lvl9pPr>
-          </a:lstStyle>
+          <a:lstStyle/>
           <a:p>
             <a:pPr lvl="0"/>
             <a:r>
@@ -4715,16 +4079,16 @@
         </p:nvSpPr>
         <p:spPr>
           <a:xfrm>
-            <a:off x="1484312" y="2971800"/>
-            <a:ext cx="3549121" cy="1828800"/>
+            <a:off x="7085012" y="2209799"/>
+            <a:ext cx="3657600" cy="2091267"/>
           </a:xfrm>
         </p:spPr>
         <p:txBody>
-          <a:bodyPr>
+          <a:bodyPr anchor="t">
             <a:normAutofit/>
           </a:bodyPr>
           <a:lstStyle>
-            <a:lvl1pPr marL="0" indent="0" algn="ctr">
+            <a:lvl1pPr marL="0" indent="0">
               <a:buNone/>
               <a:defRPr sz="1600"/>
             </a:lvl1pPr>
@@ -4787,7 +4151,7 @@
           <a:p>
             <a:fld id="{D406E69D-613E-4019-8533-7F772451DAA2}" type="datetimeFigureOut">
               <a:rPr lang="fr-CH" smtClean="0"/>
-              <a:t>11.02.2019</a:t>
+              <a:t>18.02.2019</a:t>
             </a:fld>
             <a:endParaRPr lang="fr-CH"/>
           </a:p>
@@ -4838,7 +4202,7 @@
     </p:spTree>
     <p:extLst>
       <p:ext uri="{BB962C8B-B14F-4D97-AF65-F5344CB8AC3E}">
-        <p14:creationId xmlns:p14="http://schemas.microsoft.com/office/powerpoint/2010/main" val="195037248"/>
+        <p14:creationId xmlns:p14="http://schemas.microsoft.com/office/powerpoint/2010/main" val="994231821"/>
       </p:ext>
     </p:extLst>
   </p:cSld>
@@ -4877,8 +4241,8 @@
         </p:nvSpPr>
         <p:spPr>
           <a:xfrm>
-            <a:off x="1482724" y="1752599"/>
-            <a:ext cx="5426158" cy="1371600"/>
+            <a:off x="4722812" y="1447800"/>
+            <a:ext cx="6019800" cy="1143000"/>
           </a:xfrm>
         </p:spPr>
         <p:txBody>
@@ -4886,7 +4250,7 @@
             <a:normAutofit/>
           </a:bodyPr>
           <a:lstStyle>
-            <a:lvl1pPr algn="ctr">
+            <a:lvl1pPr algn="l">
               <a:defRPr sz="2800" b="0"/>
             </a:lvl1pPr>
           </a:lstStyle>
@@ -4911,29 +4275,21 @@
         </p:nvSpPr>
         <p:spPr>
           <a:xfrm>
-            <a:off x="7594682" y="914400"/>
+            <a:off x="989012" y="914400"/>
             <a:ext cx="3280974" cy="4572000"/>
           </a:xfrm>
-          <a:prstGeom prst="roundRect">
+          <a:prstGeom prst="snip2DiagRect">
             <a:avLst>
-              <a:gd name="adj" fmla="val 4280"/>
+              <a:gd name="adj1" fmla="val 10815"/>
+              <a:gd name="adj2" fmla="val 0"/>
             </a:avLst>
           </a:prstGeom>
-          <a:ln w="38100">
-            <a:gradFill flip="none" rotWithShape="1">
-              <a:gsLst>
-                <a:gs pos="0">
-                  <a:schemeClr val="bg2"/>
-                </a:gs>
-                <a:gs pos="100000">
-                  <a:schemeClr val="bg2">
-                    <a:lumMod val="75000"/>
-                  </a:schemeClr>
-                </a:gs>
-              </a:gsLst>
-              <a:lin ang="5400000" scaled="0"/>
-              <a:tileRect/>
-            </a:gradFill>
+          <a:ln w="15875">
+            <a:solidFill>
+              <a:schemeClr val="tx1">
+                <a:alpha val="40000"/>
+              </a:schemeClr>
+            </a:solidFill>
           </a:ln>
           <a:effectLst>
             <a:innerShdw blurRad="57150" dist="38100" dir="14460000">
@@ -5006,16 +4362,16 @@
         </p:nvSpPr>
         <p:spPr>
           <a:xfrm>
-            <a:off x="1482724" y="3124199"/>
-            <a:ext cx="5426158" cy="1828800"/>
+            <a:off x="4722812" y="2777066"/>
+            <a:ext cx="6021388" cy="2048933"/>
           </a:xfrm>
         </p:spPr>
         <p:txBody>
-          <a:bodyPr>
+          <a:bodyPr anchor="t">
             <a:normAutofit/>
           </a:bodyPr>
           <a:lstStyle>
-            <a:lvl1pPr marL="0" indent="0" algn="ctr">
+            <a:lvl1pPr marL="0" indent="0">
               <a:buNone/>
               <a:defRPr sz="1800"/>
             </a:lvl1pPr>
@@ -5078,7 +4434,7 @@
           <a:p>
             <a:fld id="{D406E69D-613E-4019-8533-7F772451DAA2}" type="datetimeFigureOut">
               <a:rPr lang="fr-CH" smtClean="0"/>
-              <a:t>11.02.2019</a:t>
+              <a:t>18.02.2019</a:t>
             </a:fld>
             <a:endParaRPr lang="fr-CH"/>
           </a:p>
@@ -5129,7 +4485,7 @@
     </p:spTree>
     <p:extLst>
       <p:ext uri="{BB962C8B-B14F-4D97-AF65-F5344CB8AC3E}">
-        <p14:creationId xmlns:p14="http://schemas.microsoft.com/office/powerpoint/2010/main" val="188625199"/>
+        <p14:creationId xmlns:p14="http://schemas.microsoft.com/office/powerpoint/2010/main" val="1858301480"/>
       </p:ext>
     </p:extLst>
   </p:cSld>
@@ -5143,7 +4499,7 @@
 <p:sldMaster xmlns:a="http://schemas.openxmlformats.org/drawingml/2006/main" xmlns:r="http://schemas.openxmlformats.org/officeDocument/2006/relationships" xmlns:p="http://schemas.openxmlformats.org/presentationml/2006/main">
   <p:cSld>
     <p:bg>
-      <p:bgRef idx="1003">
+      <p:bgRef idx="1002">
         <a:schemeClr val="bg2"/>
       </p:bgRef>
     </p:bg>
@@ -5169,313 +4525,187 @@
         </p:nvGrpSpPr>
         <p:grpSpPr>
           <a:xfrm>
-            <a:off x="150812" y="0"/>
-            <a:ext cx="2436813" cy="6858001"/>
-            <a:chOff x="1320800" y="0"/>
-            <a:chExt cx="2436813" cy="6858001"/>
+            <a:off x="9206969" y="2963333"/>
+            <a:ext cx="2981858" cy="3208867"/>
+            <a:chOff x="9206969" y="2963333"/>
+            <a:chExt cx="2981858" cy="3208867"/>
           </a:xfrm>
         </p:grpSpPr>
-        <p:sp>
-          <p:nvSpPr>
-            <p:cNvPr id="8" name="Freeform 6"/>
-            <p:cNvSpPr/>
+        <p:cxnSp>
+          <p:nvCxnSpPr>
+            <p:cNvPr id="8" name="Straight Connector 7"/>
+            <p:cNvCxnSpPr/>
             <p:nvPr/>
-          </p:nvSpPr>
-          <p:spPr bwMode="auto">
-            <a:xfrm>
-              <a:off x="1627188" y="0"/>
-              <a:ext cx="1122363" cy="5329238"/>
+          </p:nvCxnSpPr>
+          <p:spPr>
+            <a:xfrm flipH="1">
+              <a:off x="11276012" y="2963333"/>
+              <a:ext cx="912814" cy="912812"/>
             </a:xfrm>
-            <a:custGeom>
+            <a:prstGeom prst="line">
               <a:avLst/>
-              <a:gdLst/>
-              <a:ahLst/>
-              <a:cxnLst/>
-              <a:rect l="0" t="0" r="r" b="b"/>
-              <a:pathLst>
-                <a:path w="707" h="3357">
-                  <a:moveTo>
-                    <a:pt x="0" y="3330"/>
-                  </a:moveTo>
-                  <a:lnTo>
-                    <a:pt x="156" y="3357"/>
-                  </a:lnTo>
-                  <a:lnTo>
-                    <a:pt x="707" y="0"/>
-                  </a:lnTo>
-                  <a:lnTo>
-                    <a:pt x="547" y="0"/>
-                  </a:lnTo>
-                  <a:lnTo>
-                    <a:pt x="0" y="3330"/>
-                  </a:lnTo>
-                  <a:close/>
-                </a:path>
-              </a:pathLst>
-            </a:custGeom>
-            <a:solidFill>
-              <a:schemeClr val="accent1"/>
-            </a:solidFill>
-            <a:ln>
-              <a:noFill/>
+            </a:prstGeom>
+            <a:ln w="9525">
+              <a:solidFill>
+                <a:schemeClr val="tx1"/>
+              </a:solidFill>
             </a:ln>
           </p:spPr>
-        </p:sp>
-        <p:sp>
-          <p:nvSpPr>
-            <p:cNvPr id="9" name="Freeform 7"/>
-            <p:cNvSpPr/>
+          <p:style>
+            <a:lnRef idx="2">
+              <a:schemeClr val="accent1"/>
+            </a:lnRef>
+            <a:fillRef idx="0">
+              <a:schemeClr val="accent1"/>
+            </a:fillRef>
+            <a:effectRef idx="1">
+              <a:schemeClr val="accent1"/>
+            </a:effectRef>
+            <a:fontRef idx="minor">
+              <a:schemeClr val="tx1"/>
+            </a:fontRef>
+          </p:style>
+        </p:cxnSp>
+        <p:cxnSp>
+          <p:nvCxnSpPr>
+            <p:cNvPr id="9" name="Straight Connector 8"/>
+            <p:cNvCxnSpPr/>
             <p:nvPr/>
-          </p:nvSpPr>
-          <p:spPr bwMode="auto">
-            <a:xfrm>
-              <a:off x="1320800" y="0"/>
-              <a:ext cx="1117600" cy="5276850"/>
+          </p:nvCxnSpPr>
+          <p:spPr>
+            <a:xfrm flipH="1">
+              <a:off x="9206969" y="3190344"/>
+              <a:ext cx="2981857" cy="2981856"/>
             </a:xfrm>
-            <a:custGeom>
+            <a:prstGeom prst="line">
               <a:avLst/>
-              <a:gdLst/>
-              <a:ahLst/>
-              <a:cxnLst/>
-              <a:rect l="0" t="0" r="r" b="b"/>
-              <a:pathLst>
-                <a:path w="704" h="3324">
-                  <a:moveTo>
-                    <a:pt x="704" y="0"/>
-                  </a:moveTo>
-                  <a:lnTo>
-                    <a:pt x="545" y="0"/>
-                  </a:lnTo>
-                  <a:lnTo>
-                    <a:pt x="0" y="3300"/>
-                  </a:lnTo>
-                  <a:lnTo>
-                    <a:pt x="157" y="3324"/>
-                  </a:lnTo>
-                  <a:lnTo>
-                    <a:pt x="704" y="0"/>
-                  </a:lnTo>
-                  <a:close/>
-                </a:path>
-              </a:pathLst>
-            </a:custGeom>
-            <a:solidFill>
-              <a:schemeClr val="tx1">
-                <a:lumMod val="65000"/>
-                <a:lumOff val="35000"/>
-              </a:schemeClr>
-            </a:solidFill>
-            <a:ln>
-              <a:noFill/>
+            </a:prstGeom>
+            <a:ln w="9525">
+              <a:solidFill>
+                <a:schemeClr val="tx1"/>
+              </a:solidFill>
             </a:ln>
           </p:spPr>
-        </p:sp>
-        <p:sp>
-          <p:nvSpPr>
-            <p:cNvPr id="10" name="Freeform 8"/>
-            <p:cNvSpPr/>
+          <p:style>
+            <a:lnRef idx="2">
+              <a:schemeClr val="accent1"/>
+            </a:lnRef>
+            <a:fillRef idx="0">
+              <a:schemeClr val="accent1"/>
+            </a:fillRef>
+            <a:effectRef idx="1">
+              <a:schemeClr val="accent1"/>
+            </a:effectRef>
+            <a:fontRef idx="minor">
+              <a:schemeClr val="tx1"/>
+            </a:fontRef>
+          </p:style>
+        </p:cxnSp>
+        <p:cxnSp>
+          <p:nvCxnSpPr>
+            <p:cNvPr id="10" name="Straight Connector 9"/>
+            <p:cNvCxnSpPr/>
             <p:nvPr/>
-          </p:nvSpPr>
-          <p:spPr bwMode="auto">
-            <a:xfrm>
-              <a:off x="1320800" y="5238750"/>
-              <a:ext cx="1228725" cy="1619250"/>
+          </p:nvCxnSpPr>
+          <p:spPr>
+            <a:xfrm flipH="1">
+              <a:off x="10292292" y="3285067"/>
+              <a:ext cx="1896534" cy="1896533"/>
             </a:xfrm>
-            <a:custGeom>
+            <a:prstGeom prst="line">
               <a:avLst/>
-              <a:gdLst/>
-              <a:ahLst/>
-              <a:cxnLst/>
-              <a:rect l="0" t="0" r="r" b="b"/>
-              <a:pathLst>
-                <a:path w="774" h="1020">
-                  <a:moveTo>
-                    <a:pt x="0" y="0"/>
-                  </a:moveTo>
-                  <a:lnTo>
-                    <a:pt x="740" y="1020"/>
-                  </a:lnTo>
-                  <a:lnTo>
-                    <a:pt x="774" y="1020"/>
-                  </a:lnTo>
-                  <a:lnTo>
-                    <a:pt x="0" y="0"/>
-                  </a:lnTo>
-                  <a:close/>
-                </a:path>
-              </a:pathLst>
-            </a:custGeom>
-            <a:solidFill>
-              <a:schemeClr val="tx1">
-                <a:lumMod val="85000"/>
-                <a:lumOff val="15000"/>
-              </a:schemeClr>
-            </a:solidFill>
-            <a:ln>
-              <a:noFill/>
+            </a:prstGeom>
+            <a:ln w="9525">
+              <a:solidFill>
+                <a:schemeClr val="tx1"/>
+              </a:solidFill>
             </a:ln>
           </p:spPr>
-        </p:sp>
-        <p:sp>
-          <p:nvSpPr>
-            <p:cNvPr id="11" name="Freeform 9"/>
-            <p:cNvSpPr/>
+          <p:style>
+            <a:lnRef idx="2">
+              <a:schemeClr val="accent1"/>
+            </a:lnRef>
+            <a:fillRef idx="0">
+              <a:schemeClr val="accent1"/>
+            </a:fillRef>
+            <a:effectRef idx="1">
+              <a:schemeClr val="accent1"/>
+            </a:effectRef>
+            <a:fontRef idx="minor">
+              <a:schemeClr val="tx1"/>
+            </a:fontRef>
+          </p:style>
+        </p:cxnSp>
+        <p:cxnSp>
+          <p:nvCxnSpPr>
+            <p:cNvPr id="11" name="Straight Connector 10"/>
+            <p:cNvCxnSpPr/>
             <p:nvPr/>
-          </p:nvSpPr>
-          <p:spPr bwMode="auto">
-            <a:xfrm>
-              <a:off x="1627188" y="5291138"/>
-              <a:ext cx="1495425" cy="1566863"/>
+          </p:nvCxnSpPr>
+          <p:spPr>
+            <a:xfrm flipH="1">
+              <a:off x="10443103" y="3131080"/>
+              <a:ext cx="1745722" cy="1745720"/>
             </a:xfrm>
-            <a:custGeom>
+            <a:prstGeom prst="line">
               <a:avLst/>
-              <a:gdLst/>
-              <a:ahLst/>
-              <a:cxnLst/>
-              <a:rect l="0" t="0" r="r" b="b"/>
-              <a:pathLst>
-                <a:path w="942" h="987">
-                  <a:moveTo>
-                    <a:pt x="0" y="0"/>
-                  </a:moveTo>
-                  <a:lnTo>
-                    <a:pt x="909" y="987"/>
-                  </a:lnTo>
-                  <a:lnTo>
-                    <a:pt x="942" y="987"/>
-                  </a:lnTo>
-                  <a:lnTo>
-                    <a:pt x="0" y="0"/>
-                  </a:lnTo>
-                  <a:close/>
-                </a:path>
-              </a:pathLst>
-            </a:custGeom>
-            <a:solidFill>
-              <a:schemeClr val="accent1">
-                <a:lumMod val="50000"/>
-              </a:schemeClr>
-            </a:solidFill>
-            <a:ln>
-              <a:noFill/>
+            </a:prstGeom>
+            <a:ln w="28575">
+              <a:solidFill>
+                <a:schemeClr val="tx1"/>
+              </a:solidFill>
             </a:ln>
           </p:spPr>
-        </p:sp>
-        <p:sp>
-          <p:nvSpPr>
-            <p:cNvPr id="12" name="Freeform 10"/>
-            <p:cNvSpPr/>
+          <p:style>
+            <a:lnRef idx="2">
+              <a:schemeClr val="accent1"/>
+            </a:lnRef>
+            <a:fillRef idx="0">
+              <a:schemeClr val="accent1"/>
+            </a:fillRef>
+            <a:effectRef idx="1">
+              <a:schemeClr val="accent1"/>
+            </a:effectRef>
+            <a:fontRef idx="minor">
+              <a:schemeClr val="tx1"/>
+            </a:fontRef>
+          </p:style>
+        </p:cxnSp>
+        <p:cxnSp>
+          <p:nvCxnSpPr>
+            <p:cNvPr id="12" name="Straight Connector 11"/>
+            <p:cNvCxnSpPr/>
             <p:nvPr/>
-          </p:nvSpPr>
-          <p:spPr bwMode="auto">
-            <a:xfrm>
-              <a:off x="1627188" y="5286375"/>
-              <a:ext cx="2130425" cy="1571625"/>
+          </p:nvCxnSpPr>
+          <p:spPr>
+            <a:xfrm flipH="1">
+              <a:off x="10918826" y="3683001"/>
+              <a:ext cx="1270001" cy="1269999"/>
             </a:xfrm>
-            <a:custGeom>
+            <a:prstGeom prst="line">
               <a:avLst/>
-              <a:gdLst/>
-              <a:ahLst/>
-              <a:cxnLst/>
-              <a:rect l="0" t="0" r="r" b="b"/>
-              <a:pathLst>
-                <a:path w="1342" h="990">
-                  <a:moveTo>
-                    <a:pt x="0" y="3"/>
-                  </a:moveTo>
-                  <a:lnTo>
-                    <a:pt x="942" y="990"/>
-                  </a:lnTo>
-                  <a:lnTo>
-                    <a:pt x="1342" y="990"/>
-                  </a:lnTo>
-                  <a:lnTo>
-                    <a:pt x="156" y="27"/>
-                  </a:lnTo>
-                  <a:lnTo>
-                    <a:pt x="0" y="0"/>
-                  </a:lnTo>
-                  <a:lnTo>
-                    <a:pt x="0" y="3"/>
-                  </a:lnTo>
-                  <a:close/>
-                </a:path>
-              </a:pathLst>
-            </a:custGeom>
-            <a:solidFill>
-              <a:schemeClr val="accent1">
-                <a:lumMod val="75000"/>
-              </a:schemeClr>
-            </a:solidFill>
-            <a:ln>
-              <a:noFill/>
+            </a:prstGeom>
+            <a:ln w="28575">
+              <a:solidFill>
+                <a:schemeClr val="tx1"/>
+              </a:solidFill>
             </a:ln>
           </p:spPr>
-        </p:sp>
-        <p:sp>
-          <p:nvSpPr>
-            <p:cNvPr id="13" name="Freeform 11"/>
-            <p:cNvSpPr/>
-            <p:nvPr/>
-          </p:nvSpPr>
-          <p:spPr bwMode="auto">
-            <a:xfrm>
-              <a:off x="1320800" y="5238750"/>
-              <a:ext cx="1695450" cy="1619250"/>
-            </a:xfrm>
-            <a:custGeom>
-              <a:avLst/>
-              <a:gdLst/>
-              <a:ahLst/>
-              <a:cxnLst/>
-              <a:rect l="0" t="0" r="r" b="b"/>
-              <a:pathLst>
-                <a:path w="1068" h="1020">
-                  <a:moveTo>
-                    <a:pt x="1068" y="1020"/>
-                  </a:moveTo>
-                  <a:lnTo>
-                    <a:pt x="184" y="60"/>
-                  </a:lnTo>
-                  <a:lnTo>
-                    <a:pt x="154" y="27"/>
-                  </a:lnTo>
-                  <a:lnTo>
-                    <a:pt x="157" y="27"/>
-                  </a:lnTo>
-                  <a:lnTo>
-                    <a:pt x="157" y="24"/>
-                  </a:lnTo>
-                  <a:lnTo>
-                    <a:pt x="154" y="24"/>
-                  </a:lnTo>
-                  <a:lnTo>
-                    <a:pt x="0" y="0"/>
-                  </a:lnTo>
-                  <a:lnTo>
-                    <a:pt x="0" y="0"/>
-                  </a:lnTo>
-                  <a:lnTo>
-                    <a:pt x="774" y="1020"/>
-                  </a:lnTo>
-                  <a:lnTo>
-                    <a:pt x="1068" y="1020"/>
-                  </a:lnTo>
-                  <a:close/>
-                </a:path>
-              </a:pathLst>
-            </a:custGeom>
-            <a:solidFill>
-              <a:schemeClr val="tx1">
-                <a:lumMod val="75000"/>
-                <a:lumOff val="25000"/>
-              </a:schemeClr>
-            </a:solidFill>
-            <a:ln>
-              <a:noFill/>
-            </a:ln>
-          </p:spPr>
-        </p:sp>
+          <p:style>
+            <a:lnRef idx="2">
+              <a:schemeClr val="accent1"/>
+            </a:lnRef>
+            <a:fillRef idx="0">
+              <a:schemeClr val="accent1"/>
+            </a:fillRef>
+            <a:effectRef idx="1">
+              <a:schemeClr val="accent1"/>
+            </a:effectRef>
+            <a:fontRef idx="minor">
+              <a:schemeClr val="tx1"/>
+            </a:fontRef>
+          </p:style>
+        </p:cxnSp>
       </p:grpSp>
       <p:sp>
         <p:nvSpPr>
@@ -5489,8 +4719,8 @@
         </p:nvSpPr>
         <p:spPr>
           <a:xfrm>
-            <a:off x="1484311" y="685800"/>
-            <a:ext cx="10018713" cy="1752599"/>
+            <a:off x="684212" y="4487332"/>
+            <a:ext cx="8534400" cy="1507067"/>
           </a:xfrm>
           <a:prstGeom prst="rect">
             <a:avLst/>
@@ -5523,8 +4753,8 @@
         </p:nvSpPr>
         <p:spPr>
           <a:xfrm>
-            <a:off x="1484310" y="2666999"/>
-            <a:ext cx="10018713" cy="3124201"/>
+            <a:off x="684212" y="685800"/>
+            <a:ext cx="8534400" cy="3615267"/>
           </a:xfrm>
           <a:prstGeom prst="rect">
             <a:avLst/>
@@ -5585,20 +4815,22 @@
         </p:nvSpPr>
         <p:spPr>
           <a:xfrm>
-            <a:off x="9732656" y="5883275"/>
-            <a:ext cx="1143000" cy="365125"/>
+            <a:off x="9904412" y="6172200"/>
+            <a:ext cx="1600200" cy="365125"/>
           </a:xfrm>
           <a:prstGeom prst="rect">
             <a:avLst/>
           </a:prstGeom>
         </p:spPr>
         <p:txBody>
-          <a:bodyPr vert="horz" lIns="91440" tIns="45720" rIns="91440" bIns="45720" rtlCol="0" anchor="ctr"/>
+          <a:bodyPr vert="horz" lIns="91440" tIns="45720" rIns="91440" bIns="45720" rtlCol="0" anchor="t"/>
           <a:lstStyle>
             <a:lvl1pPr algn="r">
               <a:defRPr sz="1000" b="0" i="0">
                 <a:solidFill>
-                  <a:schemeClr val="tx1"/>
+                  <a:schemeClr val="bg2">
+                    <a:lumMod val="50000"/>
+                  </a:schemeClr>
                 </a:solidFill>
                 <a:effectLst/>
                 <a:latin typeface="+mn-lt"/>
@@ -5608,7 +4840,7 @@
           <a:p>
             <a:fld id="{D406E69D-613E-4019-8533-7F772451DAA2}" type="datetimeFigureOut">
               <a:rPr lang="fr-CH" smtClean="0"/>
-              <a:t>11.02.2019</a:t>
+              <a:t>18.02.2019</a:t>
             </a:fld>
             <a:endParaRPr lang="fr-CH"/>
           </a:p>
@@ -5626,20 +4858,22 @@
         </p:nvSpPr>
         <p:spPr>
           <a:xfrm>
-            <a:off x="2572279" y="5883275"/>
-            <a:ext cx="7084177" cy="365125"/>
+            <a:off x="684212" y="6172200"/>
+            <a:ext cx="7543800" cy="365125"/>
           </a:xfrm>
           <a:prstGeom prst="rect">
             <a:avLst/>
           </a:prstGeom>
         </p:spPr>
         <p:txBody>
-          <a:bodyPr vert="horz" lIns="91440" tIns="45720" rIns="91440" bIns="45720" rtlCol="0" anchor="ctr"/>
+          <a:bodyPr vert="horz" lIns="91440" tIns="45720" rIns="91440" bIns="45720" rtlCol="0" anchor="t"/>
           <a:lstStyle>
             <a:lvl1pPr algn="l">
               <a:defRPr sz="1000" b="0" i="0">
                 <a:solidFill>
-                  <a:schemeClr val="tx1"/>
+                  <a:schemeClr val="bg2">
+                    <a:lumMod val="50000"/>
+                  </a:schemeClr>
                 </a:solidFill>
                 <a:effectLst/>
                 <a:latin typeface="+mn-lt"/>
@@ -5663,20 +4897,22 @@
         </p:nvSpPr>
         <p:spPr>
           <a:xfrm>
-            <a:off x="10951856" y="5883275"/>
-            <a:ext cx="551167" cy="365125"/>
+            <a:off x="10363200" y="5578475"/>
+            <a:ext cx="1142245" cy="669925"/>
           </a:xfrm>
           <a:prstGeom prst="rect">
             <a:avLst/>
           </a:prstGeom>
         </p:spPr>
         <p:txBody>
-          <a:bodyPr vert="horz" lIns="91440" tIns="45720" rIns="91440" bIns="45720" rtlCol="0" anchor="ctr"/>
+          <a:bodyPr vert="horz" lIns="91440" tIns="45720" rIns="91440" bIns="45720" rtlCol="0" anchor="b"/>
           <a:lstStyle>
             <a:lvl1pPr algn="r">
-              <a:defRPr sz="1000" b="0" i="0">
-                <a:solidFill>
-                  <a:schemeClr val="tx1"/>
+              <a:defRPr sz="3200" b="0" i="0">
+                <a:solidFill>
+                  <a:schemeClr val="bg2">
+                    <a:lumMod val="50000"/>
+                  </a:schemeClr>
                 </a:solidFill>
                 <a:effectLst/>
                 <a:latin typeface="+mn-lt"/>
@@ -5695,38 +4931,38 @@
     </p:spTree>
     <p:extLst>
       <p:ext uri="{BB962C8B-B14F-4D97-AF65-F5344CB8AC3E}">
-        <p14:creationId xmlns:p14="http://schemas.microsoft.com/office/powerpoint/2010/main" val="427588897"/>
+        <p14:creationId xmlns:p14="http://schemas.microsoft.com/office/powerpoint/2010/main" val="3566430489"/>
       </p:ext>
     </p:extLst>
   </p:cSld>
-  <p:clrMap bg1="lt1" tx1="dk1" bg2="lt2" tx2="dk2" accent1="accent1" accent2="accent2" accent3="accent3" accent4="accent4" accent5="accent5" accent6="accent6" hlink="hlink" folHlink="folHlink"/>
+  <p:clrMap bg1="dk1" tx1="lt1" bg2="dk2" tx2="lt2" accent1="accent1" accent2="accent2" accent3="accent3" accent4="accent4" accent5="accent5" accent6="accent6" hlink="hlink" folHlink="folHlink"/>
   <p:sldLayoutIdLst>
-    <p:sldLayoutId id="2147483823" r:id="rId1"/>
-    <p:sldLayoutId id="2147483824" r:id="rId2"/>
-    <p:sldLayoutId id="2147483825" r:id="rId3"/>
-    <p:sldLayoutId id="2147483826" r:id="rId4"/>
-    <p:sldLayoutId id="2147483827" r:id="rId5"/>
-    <p:sldLayoutId id="2147483828" r:id="rId6"/>
-    <p:sldLayoutId id="2147483829" r:id="rId7"/>
-    <p:sldLayoutId id="2147483830" r:id="rId8"/>
-    <p:sldLayoutId id="2147483831" r:id="rId9"/>
-    <p:sldLayoutId id="2147483832" r:id="rId10"/>
-    <p:sldLayoutId id="2147483833" r:id="rId11"/>
-    <p:sldLayoutId id="2147483834" r:id="rId12"/>
-    <p:sldLayoutId id="2147483835" r:id="rId13"/>
-    <p:sldLayoutId id="2147483836" r:id="rId14"/>
-    <p:sldLayoutId id="2147483837" r:id="rId15"/>
-    <p:sldLayoutId id="2147483838" r:id="rId16"/>
-    <p:sldLayoutId id="2147483839" r:id="rId17"/>
+    <p:sldLayoutId id="2147483841" r:id="rId1"/>
+    <p:sldLayoutId id="2147483842" r:id="rId2"/>
+    <p:sldLayoutId id="2147483843" r:id="rId3"/>
+    <p:sldLayoutId id="2147483844" r:id="rId4"/>
+    <p:sldLayoutId id="2147483845" r:id="rId5"/>
+    <p:sldLayoutId id="2147483846" r:id="rId6"/>
+    <p:sldLayoutId id="2147483847" r:id="rId7"/>
+    <p:sldLayoutId id="2147483848" r:id="rId8"/>
+    <p:sldLayoutId id="2147483849" r:id="rId9"/>
+    <p:sldLayoutId id="2147483850" r:id="rId10"/>
+    <p:sldLayoutId id="2147483851" r:id="rId11"/>
+    <p:sldLayoutId id="2147483852" r:id="rId12"/>
+    <p:sldLayoutId id="2147483853" r:id="rId13"/>
+    <p:sldLayoutId id="2147483854" r:id="rId14"/>
+    <p:sldLayoutId id="2147483855" r:id="rId15"/>
+    <p:sldLayoutId id="2147483856" r:id="rId16"/>
+    <p:sldLayoutId id="2147483857" r:id="rId17"/>
   </p:sldLayoutIdLst>
   <p:txStyles>
     <p:titleStyle>
-      <a:lvl1pPr algn="ctr" defTabSz="457200" rtl="0" eaLnBrk="1" latinLnBrk="0" hangingPunct="1">
+      <a:lvl1pPr algn="l" defTabSz="457200" rtl="0" eaLnBrk="1" latinLnBrk="0" hangingPunct="1">
         <a:spcBef>
           <a:spcPct val="0"/>
         </a:spcBef>
         <a:buNone/>
-        <a:defRPr sz="4000" kern="1200" cap="none">
+        <a:defRPr sz="3600" kern="1200" cap="all">
           <a:ln w="3175" cmpd="sng">
             <a:noFill/>
           </a:ln>
@@ -5805,16 +5041,16 @@
           <a:spcPts val="600"/>
         </a:spcAft>
         <a:buClr>
-          <a:schemeClr val="accent1">
-            <a:lumMod val="75000"/>
-          </a:schemeClr>
+          <a:schemeClr val="tx1"/>
         </a:buClr>
-        <a:buSzPct val="145000"/>
-        <a:buFont typeface="Arial"/>
-        <a:buChar char="•"/>
-        <a:defRPr sz="2400" kern="1200" cap="none">
+        <a:buSzPct val="80000"/>
+        <a:buFont typeface="Wingdings 3" panose="05040102010807070707" pitchFamily="18" charset="2"/>
+        <a:buChar char=""/>
+        <a:defRPr sz="2000" kern="1200" cap="none">
           <a:solidFill>
-            <a:schemeClr val="tx1"/>
+            <a:schemeClr val="bg2">
+              <a:lumMod val="75000"/>
+            </a:schemeClr>
           </a:solidFill>
           <a:effectLst/>
           <a:latin typeface="+mn-lt"/>
@@ -5830,16 +5066,16 @@
           <a:spcPts val="600"/>
         </a:spcAft>
         <a:buClr>
-          <a:schemeClr val="accent1">
-            <a:lumMod val="75000"/>
-          </a:schemeClr>
+          <a:schemeClr val="tx1"/>
         </a:buClr>
-        <a:buSzPct val="145000"/>
-        <a:buFont typeface="Arial"/>
-        <a:buChar char="•"/>
-        <a:defRPr sz="2000" kern="1200" cap="none">
+        <a:buSzPct val="80000"/>
+        <a:buFont typeface="Wingdings 3" panose="05040102010807070707" pitchFamily="18" charset="2"/>
+        <a:buChar char=""/>
+        <a:defRPr sz="1800" kern="1200" cap="none">
           <a:solidFill>
-            <a:schemeClr val="tx1"/>
+            <a:schemeClr val="bg2">
+              <a:lumMod val="75000"/>
+            </a:schemeClr>
           </a:solidFill>
           <a:effectLst/>
           <a:latin typeface="+mn-lt"/>
@@ -5855,16 +5091,16 @@
           <a:spcPts val="600"/>
         </a:spcAft>
         <a:buClr>
-          <a:schemeClr val="accent1">
-            <a:lumMod val="75000"/>
-          </a:schemeClr>
+          <a:schemeClr val="tx1"/>
         </a:buClr>
-        <a:buSzPct val="145000"/>
-        <a:buFont typeface="Arial"/>
-        <a:buChar char="•"/>
-        <a:defRPr sz="1800" kern="1200" cap="none">
+        <a:buSzPct val="80000"/>
+        <a:buFont typeface="Wingdings 3" panose="05040102010807070707" pitchFamily="18" charset="2"/>
+        <a:buChar char=""/>
+        <a:defRPr sz="1600" kern="1200" cap="none">
           <a:solidFill>
-            <a:schemeClr val="tx1"/>
+            <a:schemeClr val="bg2">
+              <a:lumMod val="75000"/>
+            </a:schemeClr>
           </a:solidFill>
           <a:effectLst/>
           <a:latin typeface="+mn-lt"/>
@@ -5880,16 +5116,16 @@
           <a:spcPts val="600"/>
         </a:spcAft>
         <a:buClr>
-          <a:schemeClr val="accent1">
-            <a:lumMod val="75000"/>
-          </a:schemeClr>
+          <a:schemeClr val="tx1"/>
         </a:buClr>
-        <a:buSzPct val="145000"/>
-        <a:buFont typeface="Arial"/>
-        <a:buChar char="•"/>
-        <a:defRPr sz="1600" kern="1200" cap="none">
+        <a:buSzPct val="80000"/>
+        <a:buFont typeface="Wingdings 3" panose="05040102010807070707" pitchFamily="18" charset="2"/>
+        <a:buChar char=""/>
+        <a:defRPr sz="1400" kern="1200" cap="none">
           <a:solidFill>
-            <a:schemeClr val="tx1"/>
+            <a:schemeClr val="bg2">
+              <a:lumMod val="75000"/>
+            </a:schemeClr>
           </a:solidFill>
           <a:effectLst/>
           <a:latin typeface="+mn-lt"/>
@@ -5905,16 +5141,16 @@
           <a:spcPts val="600"/>
         </a:spcAft>
         <a:buClr>
-          <a:schemeClr val="accent1">
-            <a:lumMod val="75000"/>
-          </a:schemeClr>
+          <a:schemeClr val="tx1"/>
         </a:buClr>
-        <a:buSzPct val="145000"/>
-        <a:buFont typeface="Arial"/>
-        <a:buChar char="•"/>
+        <a:buSzPct val="80000"/>
+        <a:buFont typeface="Wingdings 3" panose="05040102010807070707" pitchFamily="18" charset="2"/>
+        <a:buChar char=""/>
         <a:defRPr sz="1400" kern="1200" cap="none">
           <a:solidFill>
-            <a:schemeClr val="tx1"/>
+            <a:schemeClr val="bg2">
+              <a:lumMod val="75000"/>
+            </a:schemeClr>
           </a:solidFill>
           <a:effectLst/>
           <a:latin typeface="+mn-lt"/>
@@ -5930,16 +5166,16 @@
           <a:spcPts val="600"/>
         </a:spcAft>
         <a:buClr>
-          <a:schemeClr val="accent1">
-            <a:lumMod val="75000"/>
-          </a:schemeClr>
+          <a:schemeClr val="tx1"/>
         </a:buClr>
-        <a:buSzPct val="145000"/>
-        <a:buFont typeface="Arial"/>
-        <a:buChar char="•"/>
+        <a:buSzPct val="80000"/>
+        <a:buFont typeface="Wingdings 3" panose="05040102010807070707" pitchFamily="18" charset="2"/>
+        <a:buChar char=""/>
         <a:defRPr sz="1400" kern="1200" cap="none">
           <a:solidFill>
-            <a:schemeClr val="tx1"/>
+            <a:schemeClr val="bg2">
+              <a:lumMod val="75000"/>
+            </a:schemeClr>
           </a:solidFill>
           <a:effectLst/>
           <a:latin typeface="+mn-lt"/>
@@ -5955,16 +5191,16 @@
           <a:spcPts val="600"/>
         </a:spcAft>
         <a:buClr>
-          <a:schemeClr val="accent1">
-            <a:lumMod val="75000"/>
-          </a:schemeClr>
+          <a:schemeClr val="tx1"/>
         </a:buClr>
-        <a:buSzPct val="145000"/>
-        <a:buFont typeface="Arial"/>
-        <a:buChar char="•"/>
+        <a:buSzPct val="80000"/>
+        <a:buFont typeface="Wingdings 3" panose="05040102010807070707" pitchFamily="18" charset="2"/>
+        <a:buChar char=""/>
         <a:defRPr sz="1400" kern="1200" cap="none">
           <a:solidFill>
-            <a:schemeClr val="tx1"/>
+            <a:schemeClr val="bg2">
+              <a:lumMod val="75000"/>
+            </a:schemeClr>
           </a:solidFill>
           <a:effectLst/>
           <a:latin typeface="+mn-lt"/>
@@ -5980,16 +5216,16 @@
           <a:spcPts val="600"/>
         </a:spcAft>
         <a:buClr>
-          <a:schemeClr val="accent1">
-            <a:lumMod val="75000"/>
-          </a:schemeClr>
+          <a:schemeClr val="tx1"/>
         </a:buClr>
-        <a:buSzPct val="145000"/>
-        <a:buFont typeface="Arial"/>
-        <a:buChar char="•"/>
+        <a:buSzPct val="80000"/>
+        <a:buFont typeface="Wingdings 3" panose="05040102010807070707" pitchFamily="18" charset="2"/>
+        <a:buChar char=""/>
         <a:defRPr sz="1400" kern="1200" cap="none">
           <a:solidFill>
-            <a:schemeClr val="tx1"/>
+            <a:schemeClr val="bg2">
+              <a:lumMod val="75000"/>
+            </a:schemeClr>
           </a:solidFill>
           <a:effectLst/>
           <a:latin typeface="+mn-lt"/>
@@ -6005,16 +5241,16 @@
           <a:spcPts val="600"/>
         </a:spcAft>
         <a:buClr>
-          <a:schemeClr val="accent1">
-            <a:lumMod val="75000"/>
-          </a:schemeClr>
+          <a:schemeClr val="tx1"/>
         </a:buClr>
-        <a:buSzPct val="145000"/>
-        <a:buFont typeface="Arial"/>
-        <a:buChar char="•"/>
+        <a:buSzPct val="80000"/>
+        <a:buFont typeface="Wingdings 3" panose="05040102010807070707" pitchFamily="18" charset="2"/>
+        <a:buChar char=""/>
         <a:defRPr sz="1400" kern="1200" cap="none">
           <a:solidFill>
-            <a:schemeClr val="tx1"/>
+            <a:schemeClr val="bg2">
+              <a:lumMod val="75000"/>
+            </a:schemeClr>
           </a:solidFill>
           <a:effectLst/>
           <a:latin typeface="+mn-lt"/>
@@ -6151,8 +5387,8 @@
         </p:nvSpPr>
         <p:spPr>
           <a:xfrm>
-            <a:off x="1817077" y="1488831"/>
-            <a:ext cx="10002469" cy="1160584"/>
+            <a:off x="558265" y="1007568"/>
+            <a:ext cx="9663764" cy="763481"/>
           </a:xfrm>
         </p:spPr>
         <p:txBody>
@@ -6162,12 +5398,29 @@
           <a:lstStyle/>
           <a:p>
             <a:r>
-              <a:rPr lang="fr-CH" dirty="0" smtClean="0">
+              <a:rPr lang="fr-CH" sz="4400" dirty="0" smtClean="0">
                 <a:cs typeface="Arial" panose="020B0604020202020204" pitchFamily="34" charset="0"/>
               </a:rPr>
-              <a:t>Module 214 – Fabrication RJ45</a:t>
-            </a:r>
-            <a:endParaRPr lang="fr-CH" dirty="0">
+              <a:t>Module 214 </a:t>
+            </a:r>
+            <a:r>
+              <a:rPr lang="fr-CH" sz="4400" dirty="0" smtClean="0">
+                <a:cs typeface="Arial" panose="020B0604020202020204" pitchFamily="34" charset="0"/>
+              </a:rPr>
+              <a:t>–</a:t>
+            </a:r>
+            <a:br>
+              <a:rPr lang="fr-CH" sz="4400" dirty="0" smtClean="0">
+                <a:cs typeface="Arial" panose="020B0604020202020204" pitchFamily="34" charset="0"/>
+              </a:rPr>
+            </a:br>
+            <a:r>
+              <a:rPr lang="fr-CH" sz="4400" dirty="0" smtClean="0">
+                <a:cs typeface="Arial" panose="020B0604020202020204" pitchFamily="34" charset="0"/>
+              </a:rPr>
+              <a:t>Fabrication de câble Ethernet</a:t>
+            </a:r>
+            <a:endParaRPr lang="fr-CH" sz="4400" dirty="0">
               <a:cs typeface="Arial" panose="020B0604020202020204" pitchFamily="34" charset="0"/>
             </a:endParaRPr>
           </a:p>
@@ -6185,7 +5438,7 @@
         </p:nvSpPr>
         <p:spPr>
           <a:xfrm>
-            <a:off x="4515377" y="3328052"/>
+            <a:off x="558265" y="3395428"/>
             <a:ext cx="7304169" cy="2216964"/>
           </a:xfrm>
         </p:spPr>
@@ -6196,53 +5449,101 @@
           <a:lstStyle/>
           <a:p>
             <a:r>
-              <a:rPr lang="fr-CH" dirty="0"/>
+              <a:rPr lang="fr-CH" dirty="0">
+                <a:solidFill>
+                  <a:schemeClr val="tx1"/>
+                </a:solidFill>
+              </a:rPr>
+              <a:t>Winston </a:t>
+            </a:r>
+            <a:r>
+              <a:rPr lang="fr-CH" b="1" dirty="0" err="1" smtClean="0">
+                <a:solidFill>
+                  <a:schemeClr val="tx1"/>
+                </a:solidFill>
+              </a:rPr>
+              <a:t>Meisen</a:t>
+            </a:r>
+            <a:endParaRPr lang="fr-CH" dirty="0" smtClean="0">
+              <a:solidFill>
+                <a:schemeClr val="tx1"/>
+              </a:solidFill>
+            </a:endParaRPr>
+          </a:p>
+          <a:p>
+            <a:r>
+              <a:rPr lang="fr-CH" dirty="0" smtClean="0">
+                <a:solidFill>
+                  <a:schemeClr val="tx1"/>
+                </a:solidFill>
+              </a:rPr>
               <a:t>Dylan </a:t>
             </a:r>
             <a:r>
-              <a:rPr lang="fr-CH" b="1" dirty="0" smtClean="0"/>
+              <a:rPr lang="fr-CH" b="1" dirty="0" smtClean="0">
+                <a:solidFill>
+                  <a:schemeClr val="tx1"/>
+                </a:solidFill>
+              </a:rPr>
               <a:t>Guiducci</a:t>
             </a:r>
-            <a:endParaRPr lang="fr-CH" dirty="0" smtClean="0"/>
-          </a:p>
-          <a:p>
-            <a:r>
-              <a:rPr lang="fr-CH" dirty="0" smtClean="0"/>
-              <a:t>Winston </a:t>
-            </a:r>
-            <a:r>
-              <a:rPr lang="fr-CH" b="1" dirty="0" smtClean="0"/>
-              <a:t>Meisen</a:t>
-            </a:r>
-            <a:endParaRPr lang="fr-CH" dirty="0" smtClean="0"/>
-          </a:p>
-          <a:p>
-            <a:r>
-              <a:rPr lang="fr-CH" dirty="0" smtClean="0"/>
+            <a:endParaRPr lang="fr-CH" dirty="0" smtClean="0">
+              <a:solidFill>
+                <a:schemeClr val="tx1"/>
+              </a:solidFill>
+            </a:endParaRPr>
+          </a:p>
+          <a:p>
+            <a:r>
+              <a:rPr lang="fr-CH" dirty="0" smtClean="0">
+                <a:solidFill>
+                  <a:schemeClr val="tx1"/>
+                </a:solidFill>
+              </a:rPr>
               <a:t>Quentin </a:t>
             </a:r>
             <a:r>
-              <a:rPr lang="fr-CH" b="1" dirty="0" smtClean="0"/>
+              <a:rPr lang="fr-CH" b="1" dirty="0" smtClean="0">
+                <a:solidFill>
+                  <a:schemeClr val="tx1"/>
+                </a:solidFill>
+              </a:rPr>
               <a:t>Krenger</a:t>
             </a:r>
           </a:p>
           <a:p>
             <a:r>
-              <a:rPr lang="fr-CH" dirty="0" smtClean="0"/>
+              <a:rPr lang="fr-CH" dirty="0" smtClean="0">
+                <a:solidFill>
+                  <a:schemeClr val="tx1"/>
+                </a:solidFill>
+              </a:rPr>
               <a:t>Osama </a:t>
             </a:r>
             <a:r>
-              <a:rPr lang="fr-CH" b="1" dirty="0" smtClean="0"/>
+              <a:rPr lang="fr-CH" b="1" dirty="0" smtClean="0">
+                <a:solidFill>
+                  <a:schemeClr val="tx1"/>
+                </a:solidFill>
+              </a:rPr>
               <a:t>Shalhoub</a:t>
             </a:r>
           </a:p>
           <a:p>
             <a:r>
-              <a:rPr lang="fr-CH" dirty="0" smtClean="0"/>
+              <a:rPr lang="fr-CH" dirty="0" smtClean="0">
+                <a:solidFill>
+                  <a:schemeClr val="tx1"/>
+                </a:solidFill>
+              </a:rPr>
               <a:t>Alexis </a:t>
             </a:r>
             <a:r>
-              <a:rPr lang="fr-CH" b="1" dirty="0" smtClean="0"/>
+              <a:rPr lang="fr-CH" b="1" dirty="0" smtClean="0">
+                <a:solidFill>
+                  <a:schemeClr val="tx1"/>
+                </a:solidFill>
+              </a:rPr>
               <a:t>Charbonney</a:t>
             </a:r>
           </a:p>
@@ -6770,9 +6071,9 @@
           </p:nvPr>
         </p:nvSpPr>
         <p:spPr>
-          <a:xfrm>
-            <a:off x="1289538" y="1465385"/>
-            <a:ext cx="10565177" cy="1617784"/>
+          <a:xfrm flipV="1">
+            <a:off x="1289538" y="789272"/>
+            <a:ext cx="5015009" cy="676113"/>
           </a:xfrm>
         </p:spPr>
         <p:txBody>
@@ -6814,7 +6115,7 @@
 </file>
 
 <file path=ppt/theme/theme1.xml><?xml version="1.0" encoding="utf-8"?>
-<a:theme xmlns:a="http://schemas.openxmlformats.org/drawingml/2006/main" name="Parallax">
+<a:theme xmlns:a="http://schemas.openxmlformats.org/drawingml/2006/main" name="Slice">
   <a:themeElements>
     <a:clrScheme name="Slipstream">
       <a:dk1>
@@ -6854,17 +6155,17 @@
         <a:srgbClr val="59A8D1"/>
       </a:folHlink>
     </a:clrScheme>
-    <a:fontScheme name="Parallax">
+    <a:fontScheme name="Slice">
       <a:majorFont>
-        <a:latin typeface="Corbel" panose="020B0503020204020204"/>
+        <a:latin typeface="Century Gothic" panose="020B0502020202020204"/>
         <a:ea typeface=""/>
         <a:cs typeface=""/>
-        <a:font script="Jpan" typeface="HGｺﾞｼｯｸM"/>
-        <a:font script="Hang" typeface="HY엽서L"/>
-        <a:font script="Hans" typeface="华文楷体"/>
-        <a:font script="Hant" typeface="新細明體"/>
+        <a:font script="Jpan" typeface="メイリオ"/>
+        <a:font script="Hang" typeface="HY중고딕"/>
+        <a:font script="Hans" typeface="幼圆"/>
+        <a:font script="Hant" typeface="微軟正黑體"/>
         <a:font script="Arab" typeface="Tahoma"/>
-        <a:font script="Hebr" typeface="Miriam"/>
+        <a:font script="Hebr" typeface="Gisha"/>
         <a:font script="Thai" typeface="DilleniaUPC"/>
         <a:font script="Ethi" typeface="Nyala"/>
         <a:font script="Beng" typeface="Vrinda"/>
@@ -6886,20 +6187,20 @@
         <a:font script="Laoo" typeface="DokChampa"/>
         <a:font script="Sinh" typeface="Iskoola Pota"/>
         <a:font script="Mong" typeface="Mongolian Baiti"/>
-        <a:font script="Viet" typeface="Arial"/>
+        <a:font script="Viet" typeface="Tahoma"/>
         <a:font script="Uigh" typeface="Microsoft Uighur"/>
         <a:font script="Geor" typeface="Sylfaen"/>
       </a:majorFont>
       <a:minorFont>
-        <a:latin typeface="Corbel" panose="020B0503020204020204"/>
+        <a:latin typeface="Century Gothic" panose="020B0502020202020204"/>
         <a:ea typeface=""/>
         <a:cs typeface=""/>
-        <a:font script="Jpan" typeface="HGｺﾞｼｯｸM"/>
-        <a:font script="Hang" typeface="HY엽서L"/>
-        <a:font script="Hans" typeface="华文楷体"/>
-        <a:font script="Hant" typeface="新細明體"/>
+        <a:font script="Jpan" typeface="メイリオ"/>
+        <a:font script="Hang" typeface="HY중고딕"/>
+        <a:font script="Hans" typeface="幼圆"/>
+        <a:font script="Hant" typeface="微軟正黑體"/>
         <a:font script="Arab" typeface="Tahoma"/>
-        <a:font script="Hebr" typeface="Miriam"/>
+        <a:font script="Hebr" typeface="Gisha"/>
         <a:font script="Thai" typeface="DilleniaUPC"/>
         <a:font script="Ethi" typeface="Nyala"/>
         <a:font script="Beng" typeface="Vrinda"/>
@@ -6921,12 +6222,12 @@
         <a:font script="Laoo" typeface="DokChampa"/>
         <a:font script="Sinh" typeface="Iskoola Pota"/>
         <a:font script="Mong" typeface="Mongolian Baiti"/>
-        <a:font script="Viet" typeface="Arial"/>
+        <a:font script="Viet" typeface="Tahoma"/>
         <a:font script="Uigh" typeface="Microsoft Uighur"/>
         <a:font script="Geor" typeface="Sylfaen"/>
       </a:minorFont>
     </a:fontScheme>
-    <a:fmtScheme name="Parallax">
+    <a:fmtScheme name="Slice">
       <a:fillStyleLst>
         <a:solidFill>
           <a:schemeClr val="phClr"/>
@@ -6935,13 +6236,16 @@
           <a:gsLst>
             <a:gs pos="0">
               <a:schemeClr val="phClr">
-                <a:tint val="60000"/>
-                <a:lumMod val="104000"/>
+                <a:tint val="62000"/>
+                <a:hueMod val="94000"/>
+                <a:satMod val="140000"/>
+                <a:lumMod val="110000"/>
               </a:schemeClr>
             </a:gs>
             <a:gs pos="100000">
               <a:schemeClr val="phClr">
                 <a:tint val="84000"/>
+                <a:satMod val="160000"/>
               </a:schemeClr>
             </a:gs>
           </a:gsLst>
@@ -6951,38 +6255,42 @@
           <a:gsLst>
             <a:gs pos="0">
               <a:schemeClr val="phClr">
-                <a:tint val="96000"/>
-                <a:lumMod val="102000"/>
+                <a:tint val="98000"/>
+                <a:hueMod val="94000"/>
+                <a:satMod val="130000"/>
+                <a:lumMod val="128000"/>
               </a:schemeClr>
             </a:gs>
             <a:gs pos="100000">
               <a:schemeClr val="phClr">
-                <a:shade val="88000"/>
-                <a:lumMod val="94000"/>
+                <a:shade val="94000"/>
+                <a:lumMod val="88000"/>
               </a:schemeClr>
             </a:gs>
           </a:gsLst>
-          <a:path path="circle">
-            <a:fillToRect l="50000" t="100000" r="100000" b="50000"/>
-          </a:path>
+          <a:lin ang="5400000" scaled="0"/>
         </a:gradFill>
       </a:fillStyleLst>
       <a:lnStyleLst>
         <a:ln w="9525" cap="rnd" cmpd="sng" algn="ctr">
           <a:solidFill>
             <a:schemeClr val="phClr">
-              <a:tint val="60000"/>
+              <a:tint val="76000"/>
+              <a:alpha val="60000"/>
+              <a:hueMod val="94000"/>
             </a:schemeClr>
           </a:solidFill>
           <a:prstDash val="solid"/>
         </a:ln>
         <a:ln w="15875" cap="rnd" cmpd="sng" algn="ctr">
           <a:solidFill>
-            <a:schemeClr val="phClr"/>
+            <a:schemeClr val="phClr">
+              <a:hueMod val="94000"/>
+            </a:schemeClr>
           </a:solidFill>
           <a:prstDash val="solid"/>
         </a:ln>
-        <a:ln w="22225" cap="rnd" cmpd="sng" algn="ctr">
+        <a:ln w="28575" cap="rnd" cmpd="sng" algn="ctr">
           <a:solidFill>
             <a:schemeClr val="phClr"/>
           </a:solidFill>
@@ -6995,14 +6303,18 @@
         </a:effectStyle>
         <a:effectStyle>
           <a:effectLst>
-            <a:reflection blurRad="12700" stA="26000" endPos="32000" dist="12700" dir="5400000" sy="-100000" rotWithShape="0"/>
+            <a:innerShdw blurRad="25400" dist="12700" dir="13500000">
+              <a:srgbClr val="000000">
+                <a:alpha val="45000"/>
+              </a:srgbClr>
+            </a:innerShdw>
           </a:effectLst>
         </a:effectStyle>
         <a:effectStyle>
           <a:effectLst>
-            <a:outerShdw blurRad="38100" dist="25400" dir="5400000" rotWithShape="0">
+            <a:outerShdw blurRad="50800" dist="38100" dir="5400000" rotWithShape="0">
               <a:srgbClr val="000000">
-                <a:alpha val="64000"/>
+                <a:alpha val="46000"/>
               </a:srgbClr>
             </a:outerShdw>
           </a:effectLst>
@@ -7010,12 +6322,10 @@
             <a:camera prst="orthographicFront">
               <a:rot lat="0" lon="0" rev="0"/>
             </a:camera>
-            <a:lightRig rig="threePt" dir="tl">
-              <a:rot lat="0" lon="0" rev="1200000"/>
-            </a:lightRig>
+            <a:lightRig rig="threePt" dir="t"/>
           </a:scene3d>
-          <a:sp3d>
-            <a:bevelT w="25400" h="12700"/>
+          <a:sp3d prstMaterial="plastic">
+            <a:bevelT w="25400" h="25400"/>
           </a:sp3d>
         </a:effectStyle>
       </a:effectStyleLst>
@@ -7025,37 +6335,46 @@
         </a:solidFill>
         <a:gradFill rotWithShape="1">
           <a:gsLst>
-            <a:gs pos="0">
+            <a:gs pos="10000">
               <a:schemeClr val="phClr">
-                <a:tint val="90000"/>
-                <a:lumMod val="110000"/>
+                <a:tint val="97000"/>
+                <a:hueMod val="92000"/>
+                <a:satMod val="169000"/>
+                <a:lumMod val="164000"/>
               </a:schemeClr>
             </a:gs>
             <a:gs pos="100000">
               <a:schemeClr val="phClr">
-                <a:shade val="64000"/>
-                <a:lumMod val="98000"/>
+                <a:shade val="96000"/>
+                <a:satMod val="120000"/>
+                <a:lumMod val="90000"/>
               </a:schemeClr>
             </a:gs>
           </a:gsLst>
-          <a:lin ang="5400000" scaled="0"/>
+          <a:lin ang="6120000" scaled="1"/>
         </a:gradFill>
-        <a:blipFill rotWithShape="1">
-          <a:blip xmlns:r="http://schemas.openxmlformats.org/officeDocument/2006/relationships" r:embed="rId1">
-            <a:duotone>
+        <a:gradFill rotWithShape="1">
+          <a:gsLst>
+            <a:gs pos="0">
               <a:schemeClr val="phClr">
-                <a:shade val="76000"/>
-                <a:satMod val="180000"/>
+                <a:tint val="97000"/>
+                <a:hueMod val="92000"/>
+                <a:satMod val="169000"/>
+                <a:lumMod val="164000"/>
               </a:schemeClr>
+            </a:gs>
+            <a:gs pos="100000">
               <a:schemeClr val="phClr">
-                <a:tint val="80000"/>
+                <a:shade val="96000"/>
                 <a:satMod val="120000"/>
-                <a:lumMod val="180000"/>
+                <a:lumMod val="90000"/>
               </a:schemeClr>
-            </a:duotone>
-          </a:blip>
-          <a:stretch/>
-        </a:blipFill>
+            </a:gs>
+          </a:gsLst>
+          <a:path path="circle">
+            <a:fillToRect b="100000"/>
+          </a:path>
+        </a:gradFill>
       </a:bgFillStyleLst>
     </a:fmtScheme>
   </a:themeElements>
@@ -7063,7 +6382,7 @@
   <a:extraClrSchemeLst/>
   <a:extLst>
     <a:ext uri="{05A4C25C-085E-4340-85A3-A5531E510DB2}">
-      <thm15:themeFamily xmlns:thm15="http://schemas.microsoft.com/office/thememl/2012/main" name="Parallax" id="{3388167B-A2EB-4685-9635-1831D9AEF8C4}" vid="{93B4CCAC-FD5A-4D59-B1AC-EAF45910B5A9}"/>
+      <thm15:themeFamily xmlns:thm15="http://schemas.microsoft.com/office/thememl/2012/main" name="Slice" id="{0507925B-6AC9-4358-8E18-C330545D08F8}" vid="{13FEC7C6-62A9-40C4-99D2-581AACACAA2F}"/>
     </a:ext>
   </a:extLst>
 </a:theme>

</xml_diff>